<commit_message>
Presentation Update without HW Outputs
</commit_message>
<xml_diff>
--- a/esd final.pptx
+++ b/esd final.pptx
@@ -22,10 +22,11 @@
     <p:sldId id="283" r:id="rId16"/>
     <p:sldId id="282" r:id="rId17"/>
     <p:sldId id="286" r:id="rId18"/>
-    <p:sldId id="292" r:id="rId19"/>
-    <p:sldId id="293" r:id="rId20"/>
-    <p:sldId id="294" r:id="rId21"/>
-    <p:sldId id="295" r:id="rId22"/>
+    <p:sldId id="297" r:id="rId19"/>
+    <p:sldId id="292" r:id="rId20"/>
+    <p:sldId id="293" r:id="rId21"/>
+    <p:sldId id="294" r:id="rId22"/>
+    <p:sldId id="295" r:id="rId23"/>
   </p:sldIdLst>
   <p:sldSz cx="9144000" cy="6858000" type="screen4x3"/>
   <p:notesSz cx="6858000" cy="9144000"/>
@@ -126,7 +127,7 @@
   </p:defaultTextStyle>
   <p:extLst>
     <p:ext uri="{EFAFB233-063F-42B5-8137-9DF3F51BA10A}">
-      <p15:sldGuideLst xmlns:p15="http://schemas.microsoft.com/office/powerpoint/2012/main" xmlns="">
+      <p15:sldGuideLst xmlns:p15="http://schemas.microsoft.com/office/powerpoint/2012/main">
         <p15:guide id="1" orient="horz" pos="2160">
           <p15:clr>
             <a:srgbClr val="A4A3A4"/>
@@ -366,7 +367,7 @@
           <a:blip r:embed="rId3" cstate="print">
             <a:extLst>
               <a:ext uri="{28A0092B-C50C-407E-A947-70E740481C1C}">
-                <a14:useLocalDpi xmlns:a14="http://schemas.microsoft.com/office/drawing/2010/main" xmlns="" val="0"/>
+                <a14:useLocalDpi xmlns:a14="http://schemas.microsoft.com/office/drawing/2010/main" val="0"/>
               </a:ext>
             </a:extLst>
           </a:blip>
@@ -1920,7 +1921,7 @@
           <a:blip r:embed="rId3" cstate="print">
             <a:extLst>
               <a:ext uri="{28A0092B-C50C-407E-A947-70E740481C1C}">
-                <a14:useLocalDpi xmlns:a14="http://schemas.microsoft.com/office/drawing/2010/main" xmlns="" val="0"/>
+                <a14:useLocalDpi xmlns:a14="http://schemas.microsoft.com/office/drawing/2010/main" val="0"/>
               </a:ext>
             </a:extLst>
           </a:blip>
@@ -2046,7 +2047,7 @@
     </p:spTree>
     <p:extLst>
       <p:ext uri="{BB962C8B-B14F-4D97-AF65-F5344CB8AC3E}">
-        <p14:creationId xmlns:p14="http://schemas.microsoft.com/office/powerpoint/2010/main" xmlns="" val="113624312"/>
+        <p14:creationId xmlns:p14="http://schemas.microsoft.com/office/powerpoint/2010/main" val="113624312"/>
       </p:ext>
     </p:extLst>
   </p:cSld>
@@ -9971,7 +9972,7 @@
             <a:fld id="{D03DC603-C5F6-4A82-B252-8D9BD6F91242}" type="datetimeFigureOut">
               <a:rPr lang="en-US" smtClean="0"/>
               <a:pPr/>
-              <a:t>11-Feb-21</a:t>
+              <a:t>2/11/2021</a:t>
             </a:fld>
             <a:endParaRPr lang="en-US"/>
           </a:p>
@@ -10368,8 +10369,13 @@
           <a:p>
             <a:r>
               <a:rPr lang="en-US" dirty="0" smtClean="0"/>
-              <a:t>Jeevaraam K</a:t>
-            </a:r>
+              <a:t>Jeevaraam </a:t>
+            </a:r>
+            <a:r>
+              <a:rPr lang="en-US" dirty="0" smtClean="0"/>
+              <a:t>K (2020H1400216H)</a:t>
+            </a:r>
+            <a:endParaRPr lang="en-US" dirty="0" smtClean="0"/>
           </a:p>
           <a:p>
             <a:r>
@@ -10417,7 +10423,7 @@
     </p:spTree>
     <p:extLst>
       <p:ext uri="{BB962C8B-B14F-4D97-AF65-F5344CB8AC3E}">
-        <p14:creationId xmlns:p14="http://schemas.microsoft.com/office/powerpoint/2010/main" xmlns="" val="1445644749"/>
+        <p14:creationId xmlns:p14="http://schemas.microsoft.com/office/powerpoint/2010/main" val="1445644749"/>
       </p:ext>
     </p:extLst>
   </p:cSld>
@@ -10477,7 +10483,7 @@
     </p:spTree>
     <p:extLst>
       <p:ext uri="{BB962C8B-B14F-4D97-AF65-F5344CB8AC3E}">
-        <p14:creationId xmlns:p14="http://schemas.microsoft.com/office/powerpoint/2010/main" xmlns="" val="3506080119"/>
+        <p14:creationId xmlns:p14="http://schemas.microsoft.com/office/powerpoint/2010/main" val="3506080119"/>
       </p:ext>
     </p:extLst>
   </p:cSld>
@@ -10587,13 +10593,13 @@
           <p:nvPr>
             <p:extLst>
               <p:ext uri="{D42A27DB-BD31-4B8C-83A1-F6EECF244321}">
-                <p14:modId xmlns:p14="http://schemas.microsoft.com/office/powerpoint/2010/main" xmlns="" val="2365094172"/>
+                <p14:modId xmlns:p14="http://schemas.microsoft.com/office/powerpoint/2010/main" val="1946557350"/>
               </p:ext>
             </p:extLst>
           </p:nvPr>
         </p:nvGraphicFramePr>
         <p:xfrm>
-          <a:off x="1981200" y="2209800"/>
+          <a:off x="1949958" y="1727200"/>
           <a:ext cx="5244084" cy="3403600"/>
         </p:xfrm>
         <a:graphic>
@@ -10606,21 +10612,21 @@
                 <a:gridCol w="1181862">
                   <a:extLst>
                     <a:ext uri="{9D8B030D-6E8A-4147-A177-3AD203B41FA5}">
-                      <a16:colId xmlns:a16="http://schemas.microsoft.com/office/drawing/2014/main" xmlns="" val="4095292889"/>
+                      <a16:colId xmlns:a16="http://schemas.microsoft.com/office/drawing/2014/main" val="4095292889"/>
                     </a:ext>
                   </a:extLst>
                 </a:gridCol>
                 <a:gridCol w="1115187">
                   <a:extLst>
                     <a:ext uri="{9D8B030D-6E8A-4147-A177-3AD203B41FA5}">
-                      <a16:colId xmlns:a16="http://schemas.microsoft.com/office/drawing/2014/main" xmlns="" val="2435405040"/>
+                      <a16:colId xmlns:a16="http://schemas.microsoft.com/office/drawing/2014/main" val="2435405040"/>
                     </a:ext>
                   </a:extLst>
                 </a:gridCol>
                 <a:gridCol w="2947035">
                   <a:extLst>
                     <a:ext uri="{9D8B030D-6E8A-4147-A177-3AD203B41FA5}">
-                      <a16:colId xmlns:a16="http://schemas.microsoft.com/office/drawing/2014/main" xmlns="" val="3149681256"/>
+                      <a16:colId xmlns:a16="http://schemas.microsoft.com/office/drawing/2014/main" val="3149681256"/>
                     </a:ext>
                   </a:extLst>
                 </a:gridCol>
@@ -10691,7 +10697,7 @@
                 </a:tc>
                 <a:extLst>
                   <a:ext uri="{0D108BD9-81ED-4DB2-BD59-A6C34878D82A}">
-                    <a16:rowId xmlns:a16="http://schemas.microsoft.com/office/drawing/2014/main" xmlns="" val="3087072443"/>
+                    <a16:rowId xmlns:a16="http://schemas.microsoft.com/office/drawing/2014/main" val="3087072443"/>
                   </a:ext>
                 </a:extLst>
               </a:tr>
@@ -10761,7 +10767,7 @@
                 </a:tc>
                 <a:extLst>
                   <a:ext uri="{0D108BD9-81ED-4DB2-BD59-A6C34878D82A}">
-                    <a16:rowId xmlns:a16="http://schemas.microsoft.com/office/drawing/2014/main" xmlns="" val="3363853376"/>
+                    <a16:rowId xmlns:a16="http://schemas.microsoft.com/office/drawing/2014/main" val="3363853376"/>
                   </a:ext>
                 </a:extLst>
               </a:tr>
@@ -10831,7 +10837,7 @@
                 </a:tc>
                 <a:extLst>
                   <a:ext uri="{0D108BD9-81ED-4DB2-BD59-A6C34878D82A}">
-                    <a16:rowId xmlns:a16="http://schemas.microsoft.com/office/drawing/2014/main" xmlns="" val="1596704810"/>
+                    <a16:rowId xmlns:a16="http://schemas.microsoft.com/office/drawing/2014/main" val="1596704810"/>
                   </a:ext>
                 </a:extLst>
               </a:tr>
@@ -10901,7 +10907,7 @@
                 </a:tc>
                 <a:extLst>
                   <a:ext uri="{0D108BD9-81ED-4DB2-BD59-A6C34878D82A}">
-                    <a16:rowId xmlns:a16="http://schemas.microsoft.com/office/drawing/2014/main" xmlns="" val="621665701"/>
+                    <a16:rowId xmlns:a16="http://schemas.microsoft.com/office/drawing/2014/main" val="621665701"/>
                   </a:ext>
                 </a:extLst>
               </a:tr>
@@ -10971,7 +10977,7 @@
                 </a:tc>
                 <a:extLst>
                   <a:ext uri="{0D108BD9-81ED-4DB2-BD59-A6C34878D82A}">
-                    <a16:rowId xmlns:a16="http://schemas.microsoft.com/office/drawing/2014/main" xmlns="" val="1515685180"/>
+                    <a16:rowId xmlns:a16="http://schemas.microsoft.com/office/drawing/2014/main" val="1515685180"/>
                   </a:ext>
                 </a:extLst>
               </a:tr>
@@ -11044,7 +11050,7 @@
                 </a:tc>
                 <a:extLst>
                   <a:ext uri="{0D108BD9-81ED-4DB2-BD59-A6C34878D82A}">
-                    <a16:rowId xmlns:a16="http://schemas.microsoft.com/office/drawing/2014/main" xmlns="" val="2547034353"/>
+                    <a16:rowId xmlns:a16="http://schemas.microsoft.com/office/drawing/2014/main" val="2547034353"/>
                   </a:ext>
                 </a:extLst>
               </a:tr>
@@ -11110,7 +11116,7 @@
                 </a:tc>
                 <a:extLst>
                   <a:ext uri="{0D108BD9-81ED-4DB2-BD59-A6C34878D82A}">
-                    <a16:rowId xmlns:a16="http://schemas.microsoft.com/office/drawing/2014/main" xmlns="" val="3376754302"/>
+                    <a16:rowId xmlns:a16="http://schemas.microsoft.com/office/drawing/2014/main" val="3376754302"/>
                   </a:ext>
                 </a:extLst>
               </a:tr>
@@ -11224,13 +11230,13 @@
           <p:nvPr>
             <p:extLst>
               <p:ext uri="{D42A27DB-BD31-4B8C-83A1-F6EECF244321}">
-                <p14:modId xmlns:p14="http://schemas.microsoft.com/office/powerpoint/2010/main" xmlns="" val="2709166606"/>
+                <p14:modId xmlns:p14="http://schemas.microsoft.com/office/powerpoint/2010/main" val="3163380557"/>
               </p:ext>
             </p:extLst>
           </p:nvPr>
         </p:nvGraphicFramePr>
         <p:xfrm>
-          <a:off x="1752600" y="2057400"/>
+          <a:off x="1943600" y="1407160"/>
           <a:ext cx="5256801" cy="4043680"/>
         </p:xfrm>
         <a:graphic>
@@ -11243,21 +11249,21 @@
                 <a:gridCol w="1416892">
                   <a:extLst>
                     <a:ext uri="{9D8B030D-6E8A-4147-A177-3AD203B41FA5}">
-                      <a16:colId xmlns:a16="http://schemas.microsoft.com/office/drawing/2014/main" xmlns="" val="4095292889"/>
+                      <a16:colId xmlns:a16="http://schemas.microsoft.com/office/drawing/2014/main" val="4095292889"/>
                     </a:ext>
                   </a:extLst>
                 </a:gridCol>
                 <a:gridCol w="1816799">
                   <a:extLst>
                     <a:ext uri="{9D8B030D-6E8A-4147-A177-3AD203B41FA5}">
-                      <a16:colId xmlns:a16="http://schemas.microsoft.com/office/drawing/2014/main" xmlns="" val="2435405040"/>
+                      <a16:colId xmlns:a16="http://schemas.microsoft.com/office/drawing/2014/main" val="2435405040"/>
                     </a:ext>
                   </a:extLst>
                 </a:gridCol>
                 <a:gridCol w="2023110">
                   <a:extLst>
                     <a:ext uri="{9D8B030D-6E8A-4147-A177-3AD203B41FA5}">
-                      <a16:colId xmlns:a16="http://schemas.microsoft.com/office/drawing/2014/main" xmlns="" val="3149681256"/>
+                      <a16:colId xmlns:a16="http://schemas.microsoft.com/office/drawing/2014/main" val="3149681256"/>
                     </a:ext>
                   </a:extLst>
                 </a:gridCol>
@@ -11335,7 +11341,7 @@
                 </a:tc>
                 <a:extLst>
                   <a:ext uri="{0D108BD9-81ED-4DB2-BD59-A6C34878D82A}">
-                    <a16:rowId xmlns:a16="http://schemas.microsoft.com/office/drawing/2014/main" xmlns="" val="3087072443"/>
+                    <a16:rowId xmlns:a16="http://schemas.microsoft.com/office/drawing/2014/main" val="3087072443"/>
                   </a:ext>
                 </a:extLst>
               </a:tr>
@@ -11419,7 +11425,7 @@
                 </a:tc>
                 <a:extLst>
                   <a:ext uri="{0D108BD9-81ED-4DB2-BD59-A6C34878D82A}">
-                    <a16:rowId xmlns:a16="http://schemas.microsoft.com/office/drawing/2014/main" xmlns="" val="3363853376"/>
+                    <a16:rowId xmlns:a16="http://schemas.microsoft.com/office/drawing/2014/main" val="3363853376"/>
                   </a:ext>
                 </a:extLst>
               </a:tr>
@@ -11489,7 +11495,7 @@
                 </a:tc>
                 <a:extLst>
                   <a:ext uri="{0D108BD9-81ED-4DB2-BD59-A6C34878D82A}">
-                    <a16:rowId xmlns:a16="http://schemas.microsoft.com/office/drawing/2014/main" xmlns="" val="1596704810"/>
+                    <a16:rowId xmlns:a16="http://schemas.microsoft.com/office/drawing/2014/main" val="1596704810"/>
                   </a:ext>
                 </a:extLst>
               </a:tr>
@@ -11559,7 +11565,7 @@
                 </a:tc>
                 <a:extLst>
                   <a:ext uri="{0D108BD9-81ED-4DB2-BD59-A6C34878D82A}">
-                    <a16:rowId xmlns:a16="http://schemas.microsoft.com/office/drawing/2014/main" xmlns="" val="621665701"/>
+                    <a16:rowId xmlns:a16="http://schemas.microsoft.com/office/drawing/2014/main" val="621665701"/>
                   </a:ext>
                 </a:extLst>
               </a:tr>
@@ -11629,7 +11635,7 @@
                 </a:tc>
                 <a:extLst>
                   <a:ext uri="{0D108BD9-81ED-4DB2-BD59-A6C34878D82A}">
-                    <a16:rowId xmlns:a16="http://schemas.microsoft.com/office/drawing/2014/main" xmlns="" val="1515685180"/>
+                    <a16:rowId xmlns:a16="http://schemas.microsoft.com/office/drawing/2014/main" val="1515685180"/>
                   </a:ext>
                 </a:extLst>
               </a:tr>
@@ -11695,7 +11701,7 @@
                 </a:tc>
                 <a:extLst>
                   <a:ext uri="{0D108BD9-81ED-4DB2-BD59-A6C34878D82A}">
-                    <a16:rowId xmlns:a16="http://schemas.microsoft.com/office/drawing/2014/main" xmlns="" val="2547034353"/>
+                    <a16:rowId xmlns:a16="http://schemas.microsoft.com/office/drawing/2014/main" val="2547034353"/>
                   </a:ext>
                 </a:extLst>
               </a:tr>
@@ -11761,7 +11767,7 @@
                 </a:tc>
                 <a:extLst>
                   <a:ext uri="{0D108BD9-81ED-4DB2-BD59-A6C34878D82A}">
-                    <a16:rowId xmlns:a16="http://schemas.microsoft.com/office/drawing/2014/main" xmlns="" val="3376754302"/>
+                    <a16:rowId xmlns:a16="http://schemas.microsoft.com/office/drawing/2014/main" val="3376754302"/>
                   </a:ext>
                 </a:extLst>
               </a:tr>
@@ -11841,7 +11847,7 @@
                 </a:tc>
                 <a:extLst>
                   <a:ext uri="{0D108BD9-81ED-4DB2-BD59-A6C34878D82A}">
-                    <a16:rowId xmlns:a16="http://schemas.microsoft.com/office/drawing/2014/main" xmlns="" val="242766362"/>
+                    <a16:rowId xmlns:a16="http://schemas.microsoft.com/office/drawing/2014/main" val="242766362"/>
                   </a:ext>
                 </a:extLst>
               </a:tr>
@@ -11957,13 +11963,13 @@
           <p:nvPr>
             <p:extLst>
               <p:ext uri="{D42A27DB-BD31-4B8C-83A1-F6EECF244321}">
-                <p14:modId xmlns:p14="http://schemas.microsoft.com/office/powerpoint/2010/main" xmlns="" val="368017334"/>
+                <p14:modId xmlns:p14="http://schemas.microsoft.com/office/powerpoint/2010/main" val="1880561253"/>
               </p:ext>
             </p:extLst>
           </p:nvPr>
         </p:nvGraphicFramePr>
         <p:xfrm>
-          <a:off x="2209800" y="2438400"/>
+          <a:off x="2153150" y="1912620"/>
           <a:ext cx="4837701" cy="3032760"/>
         </p:xfrm>
         <a:graphic>
@@ -11976,21 +11982,21 @@
                 <a:gridCol w="1416892">
                   <a:extLst>
                     <a:ext uri="{9D8B030D-6E8A-4147-A177-3AD203B41FA5}">
-                      <a16:colId xmlns:a16="http://schemas.microsoft.com/office/drawing/2014/main" xmlns="" val="4095292889"/>
+                      <a16:colId xmlns:a16="http://schemas.microsoft.com/office/drawing/2014/main" val="4095292889"/>
                     </a:ext>
                   </a:extLst>
                 </a:gridCol>
                 <a:gridCol w="1816799">
                   <a:extLst>
                     <a:ext uri="{9D8B030D-6E8A-4147-A177-3AD203B41FA5}">
-                      <a16:colId xmlns:a16="http://schemas.microsoft.com/office/drawing/2014/main" xmlns="" val="2435405040"/>
+                      <a16:colId xmlns:a16="http://schemas.microsoft.com/office/drawing/2014/main" val="2435405040"/>
                     </a:ext>
                   </a:extLst>
                 </a:gridCol>
                 <a:gridCol w="1604010">
                   <a:extLst>
                     <a:ext uri="{9D8B030D-6E8A-4147-A177-3AD203B41FA5}">
-                      <a16:colId xmlns:a16="http://schemas.microsoft.com/office/drawing/2014/main" xmlns="" val="3149681256"/>
+                      <a16:colId xmlns:a16="http://schemas.microsoft.com/office/drawing/2014/main" val="3149681256"/>
                     </a:ext>
                   </a:extLst>
                 </a:gridCol>
@@ -12068,7 +12074,7 @@
                 </a:tc>
                 <a:extLst>
                   <a:ext uri="{0D108BD9-81ED-4DB2-BD59-A6C34878D82A}">
-                    <a16:rowId xmlns:a16="http://schemas.microsoft.com/office/drawing/2014/main" xmlns="" val="3087072443"/>
+                    <a16:rowId xmlns:a16="http://schemas.microsoft.com/office/drawing/2014/main" val="3087072443"/>
                   </a:ext>
                 </a:extLst>
               </a:tr>
@@ -12145,7 +12151,7 @@
                 </a:tc>
                 <a:extLst>
                   <a:ext uri="{0D108BD9-81ED-4DB2-BD59-A6C34878D82A}">
-                    <a16:rowId xmlns:a16="http://schemas.microsoft.com/office/drawing/2014/main" xmlns="" val="3363853376"/>
+                    <a16:rowId xmlns:a16="http://schemas.microsoft.com/office/drawing/2014/main" val="3363853376"/>
                   </a:ext>
                 </a:extLst>
               </a:tr>
@@ -12215,7 +12221,7 @@
                 </a:tc>
                 <a:extLst>
                   <a:ext uri="{0D108BD9-81ED-4DB2-BD59-A6C34878D82A}">
-                    <a16:rowId xmlns:a16="http://schemas.microsoft.com/office/drawing/2014/main" xmlns="" val="1596704810"/>
+                    <a16:rowId xmlns:a16="http://schemas.microsoft.com/office/drawing/2014/main" val="1596704810"/>
                   </a:ext>
                 </a:extLst>
               </a:tr>
@@ -12285,7 +12291,7 @@
                 </a:tc>
                 <a:extLst>
                   <a:ext uri="{0D108BD9-81ED-4DB2-BD59-A6C34878D82A}">
-                    <a16:rowId xmlns:a16="http://schemas.microsoft.com/office/drawing/2014/main" xmlns="" val="621665701"/>
+                    <a16:rowId xmlns:a16="http://schemas.microsoft.com/office/drawing/2014/main" val="621665701"/>
                   </a:ext>
                 </a:extLst>
               </a:tr>
@@ -12355,7 +12361,7 @@
                 </a:tc>
                 <a:extLst>
                   <a:ext uri="{0D108BD9-81ED-4DB2-BD59-A6C34878D82A}">
-                    <a16:rowId xmlns:a16="http://schemas.microsoft.com/office/drawing/2014/main" xmlns="" val="1515685180"/>
+                    <a16:rowId xmlns:a16="http://schemas.microsoft.com/office/drawing/2014/main" val="1515685180"/>
                   </a:ext>
                 </a:extLst>
               </a:tr>
@@ -12435,7 +12441,7 @@
                 </a:tc>
                 <a:extLst>
                   <a:ext uri="{0D108BD9-81ED-4DB2-BD59-A6C34878D82A}">
-                    <a16:rowId xmlns:a16="http://schemas.microsoft.com/office/drawing/2014/main" xmlns="" val="2547034353"/>
+                    <a16:rowId xmlns:a16="http://schemas.microsoft.com/office/drawing/2014/main" val="2547034353"/>
                   </a:ext>
                 </a:extLst>
               </a:tr>
@@ -12551,13 +12557,13 @@
           <p:nvPr>
             <p:extLst>
               <p:ext uri="{D42A27DB-BD31-4B8C-83A1-F6EECF244321}">
-                <p14:modId xmlns:p14="http://schemas.microsoft.com/office/powerpoint/2010/main" xmlns="" val="4201074815"/>
+                <p14:modId xmlns:p14="http://schemas.microsoft.com/office/powerpoint/2010/main" val="4240039522"/>
               </p:ext>
             </p:extLst>
           </p:nvPr>
         </p:nvGraphicFramePr>
         <p:xfrm>
-          <a:off x="1752600" y="2286000"/>
+          <a:off x="1767387" y="1963420"/>
           <a:ext cx="5609226" cy="2931160"/>
         </p:xfrm>
         <a:graphic>
@@ -12570,21 +12576,21 @@
                 <a:gridCol w="1416892">
                   <a:extLst>
                     <a:ext uri="{9D8B030D-6E8A-4147-A177-3AD203B41FA5}">
-                      <a16:colId xmlns:a16="http://schemas.microsoft.com/office/drawing/2014/main" xmlns="" val="4095292889"/>
+                      <a16:colId xmlns:a16="http://schemas.microsoft.com/office/drawing/2014/main" val="4095292889"/>
                     </a:ext>
                   </a:extLst>
                 </a:gridCol>
                 <a:gridCol w="1816799">
                   <a:extLst>
                     <a:ext uri="{9D8B030D-6E8A-4147-A177-3AD203B41FA5}">
-                      <a16:colId xmlns:a16="http://schemas.microsoft.com/office/drawing/2014/main" xmlns="" val="2435405040"/>
+                      <a16:colId xmlns:a16="http://schemas.microsoft.com/office/drawing/2014/main" val="2435405040"/>
                     </a:ext>
                   </a:extLst>
                 </a:gridCol>
                 <a:gridCol w="2375535">
                   <a:extLst>
                     <a:ext uri="{9D8B030D-6E8A-4147-A177-3AD203B41FA5}">
-                      <a16:colId xmlns:a16="http://schemas.microsoft.com/office/drawing/2014/main" xmlns="" val="3149681256"/>
+                      <a16:colId xmlns:a16="http://schemas.microsoft.com/office/drawing/2014/main" val="3149681256"/>
                     </a:ext>
                   </a:extLst>
                 </a:gridCol>
@@ -12662,7 +12668,7 @@
                 </a:tc>
                 <a:extLst>
                   <a:ext uri="{0D108BD9-81ED-4DB2-BD59-A6C34878D82A}">
-                    <a16:rowId xmlns:a16="http://schemas.microsoft.com/office/drawing/2014/main" xmlns="" val="3087072443"/>
+                    <a16:rowId xmlns:a16="http://schemas.microsoft.com/office/drawing/2014/main" val="3087072443"/>
                   </a:ext>
                 </a:extLst>
               </a:tr>
@@ -12739,7 +12745,7 @@
                 </a:tc>
                 <a:extLst>
                   <a:ext uri="{0D108BD9-81ED-4DB2-BD59-A6C34878D82A}">
-                    <a16:rowId xmlns:a16="http://schemas.microsoft.com/office/drawing/2014/main" xmlns="" val="3363853376"/>
+                    <a16:rowId xmlns:a16="http://schemas.microsoft.com/office/drawing/2014/main" val="3363853376"/>
                   </a:ext>
                 </a:extLst>
               </a:tr>
@@ -12816,7 +12822,7 @@
                 </a:tc>
                 <a:extLst>
                   <a:ext uri="{0D108BD9-81ED-4DB2-BD59-A6C34878D82A}">
-                    <a16:rowId xmlns:a16="http://schemas.microsoft.com/office/drawing/2014/main" xmlns="" val="1596704810"/>
+                    <a16:rowId xmlns:a16="http://schemas.microsoft.com/office/drawing/2014/main" val="1596704810"/>
                   </a:ext>
                 </a:extLst>
               </a:tr>
@@ -12893,7 +12899,7 @@
                 </a:tc>
                 <a:extLst>
                   <a:ext uri="{0D108BD9-81ED-4DB2-BD59-A6C34878D82A}">
-                    <a16:rowId xmlns:a16="http://schemas.microsoft.com/office/drawing/2014/main" xmlns="" val="621665701"/>
+                    <a16:rowId xmlns:a16="http://schemas.microsoft.com/office/drawing/2014/main" val="621665701"/>
                   </a:ext>
                 </a:extLst>
               </a:tr>
@@ -12973,7 +12979,7 @@
                 </a:tc>
                 <a:extLst>
                   <a:ext uri="{0D108BD9-81ED-4DB2-BD59-A6C34878D82A}">
-                    <a16:rowId xmlns:a16="http://schemas.microsoft.com/office/drawing/2014/main" xmlns="" val="2547034353"/>
+                    <a16:rowId xmlns:a16="http://schemas.microsoft.com/office/drawing/2014/main" val="2547034353"/>
                   </a:ext>
                 </a:extLst>
               </a:tr>
@@ -13089,13 +13095,13 @@
           <p:nvPr>
             <p:extLst>
               <p:ext uri="{D42A27DB-BD31-4B8C-83A1-F6EECF244321}">
-                <p14:modId xmlns:p14="http://schemas.microsoft.com/office/powerpoint/2010/main" xmlns="" val="115687776"/>
+                <p14:modId xmlns:p14="http://schemas.microsoft.com/office/powerpoint/2010/main" val="1964748452"/>
               </p:ext>
             </p:extLst>
           </p:nvPr>
         </p:nvGraphicFramePr>
         <p:xfrm>
-          <a:off x="2133600" y="2362200"/>
+          <a:off x="2028158" y="2047240"/>
           <a:ext cx="5087685" cy="2763520"/>
         </p:xfrm>
         <a:graphic>
@@ -13108,21 +13114,21 @@
                 <a:gridCol w="1416892">
                   <a:extLst>
                     <a:ext uri="{9D8B030D-6E8A-4147-A177-3AD203B41FA5}">
-                      <a16:colId xmlns:a16="http://schemas.microsoft.com/office/drawing/2014/main" xmlns="" val="4095292889"/>
+                      <a16:colId xmlns:a16="http://schemas.microsoft.com/office/drawing/2014/main" val="4095292889"/>
                     </a:ext>
                   </a:extLst>
                 </a:gridCol>
                 <a:gridCol w="1816799">
                   <a:extLst>
                     <a:ext uri="{9D8B030D-6E8A-4147-A177-3AD203B41FA5}">
-                      <a16:colId xmlns:a16="http://schemas.microsoft.com/office/drawing/2014/main" xmlns="" val="2435405040"/>
+                      <a16:colId xmlns:a16="http://schemas.microsoft.com/office/drawing/2014/main" val="2435405040"/>
                     </a:ext>
                   </a:extLst>
                 </a:gridCol>
                 <a:gridCol w="1853994">
                   <a:extLst>
                     <a:ext uri="{9D8B030D-6E8A-4147-A177-3AD203B41FA5}">
-                      <a16:colId xmlns:a16="http://schemas.microsoft.com/office/drawing/2014/main" xmlns="" val="3149681256"/>
+                      <a16:colId xmlns:a16="http://schemas.microsoft.com/office/drawing/2014/main" val="3149681256"/>
                     </a:ext>
                   </a:extLst>
                 </a:gridCol>
@@ -13200,7 +13206,7 @@
                 </a:tc>
                 <a:extLst>
                   <a:ext uri="{0D108BD9-81ED-4DB2-BD59-A6C34878D82A}">
-                    <a16:rowId xmlns:a16="http://schemas.microsoft.com/office/drawing/2014/main" xmlns="" val="3087072443"/>
+                    <a16:rowId xmlns:a16="http://schemas.microsoft.com/office/drawing/2014/main" val="3087072443"/>
                   </a:ext>
                 </a:extLst>
               </a:tr>
@@ -13284,7 +13290,7 @@
                 </a:tc>
                 <a:extLst>
                   <a:ext uri="{0D108BD9-81ED-4DB2-BD59-A6C34878D82A}">
-                    <a16:rowId xmlns:a16="http://schemas.microsoft.com/office/drawing/2014/main" xmlns="" val="3363853376"/>
+                    <a16:rowId xmlns:a16="http://schemas.microsoft.com/office/drawing/2014/main" val="3363853376"/>
                   </a:ext>
                 </a:extLst>
               </a:tr>
@@ -13354,7 +13360,7 @@
                 </a:tc>
                 <a:extLst>
                   <a:ext uri="{0D108BD9-81ED-4DB2-BD59-A6C34878D82A}">
-                    <a16:rowId xmlns:a16="http://schemas.microsoft.com/office/drawing/2014/main" xmlns="" val="1596704810"/>
+                    <a16:rowId xmlns:a16="http://schemas.microsoft.com/office/drawing/2014/main" val="1596704810"/>
                   </a:ext>
                 </a:extLst>
               </a:tr>
@@ -13424,7 +13430,7 @@
                 </a:tc>
                 <a:extLst>
                   <a:ext uri="{0D108BD9-81ED-4DB2-BD59-A6C34878D82A}">
-                    <a16:rowId xmlns:a16="http://schemas.microsoft.com/office/drawing/2014/main" xmlns="" val="621665701"/>
+                    <a16:rowId xmlns:a16="http://schemas.microsoft.com/office/drawing/2014/main" val="621665701"/>
                   </a:ext>
                 </a:extLst>
               </a:tr>
@@ -13490,7 +13496,7 @@
                 </a:tc>
                 <a:extLst>
                   <a:ext uri="{0D108BD9-81ED-4DB2-BD59-A6C34878D82A}">
-                    <a16:rowId xmlns:a16="http://schemas.microsoft.com/office/drawing/2014/main" xmlns="" val="2547034353"/>
+                    <a16:rowId xmlns:a16="http://schemas.microsoft.com/office/drawing/2014/main" val="2547034353"/>
                   </a:ext>
                 </a:extLst>
               </a:tr>
@@ -13570,7 +13576,7 @@
                 </a:tc>
                 <a:extLst>
                   <a:ext uri="{0D108BD9-81ED-4DB2-BD59-A6C34878D82A}">
-                    <a16:rowId xmlns:a16="http://schemas.microsoft.com/office/drawing/2014/main" xmlns="" val="2202116174"/>
+                    <a16:rowId xmlns:a16="http://schemas.microsoft.com/office/drawing/2014/main" val="2202116174"/>
                   </a:ext>
                 </a:extLst>
               </a:tr>
@@ -13686,13 +13692,13 @@
           <p:nvPr>
             <p:extLst>
               <p:ext uri="{D42A27DB-BD31-4B8C-83A1-F6EECF244321}">
-                <p14:modId xmlns:p14="http://schemas.microsoft.com/office/powerpoint/2010/main" xmlns="" val="1086865700"/>
+                <p14:modId xmlns:p14="http://schemas.microsoft.com/office/powerpoint/2010/main" val="4064508379"/>
               </p:ext>
             </p:extLst>
           </p:nvPr>
         </p:nvGraphicFramePr>
         <p:xfrm>
-          <a:off x="2362200" y="2743200"/>
+          <a:off x="1943100" y="1811020"/>
           <a:ext cx="5257800" cy="3235960"/>
         </p:xfrm>
         <a:graphic>
@@ -13705,21 +13711,21 @@
                 <a:gridCol w="1748174">
                   <a:extLst>
                     <a:ext uri="{9D8B030D-6E8A-4147-A177-3AD203B41FA5}">
-                      <a16:colId xmlns:a16="http://schemas.microsoft.com/office/drawing/2014/main" xmlns="" val="4095292889"/>
+                      <a16:colId xmlns:a16="http://schemas.microsoft.com/office/drawing/2014/main" val="4095292889"/>
                     </a:ext>
                   </a:extLst>
                 </a:gridCol>
                 <a:gridCol w="2241582">
                   <a:extLst>
                     <a:ext uri="{9D8B030D-6E8A-4147-A177-3AD203B41FA5}">
-                      <a16:colId xmlns:a16="http://schemas.microsoft.com/office/drawing/2014/main" xmlns="" val="2435405040"/>
+                      <a16:colId xmlns:a16="http://schemas.microsoft.com/office/drawing/2014/main" val="2435405040"/>
                     </a:ext>
                   </a:extLst>
                 </a:gridCol>
                 <a:gridCol w="1268044">
                   <a:extLst>
                     <a:ext uri="{9D8B030D-6E8A-4147-A177-3AD203B41FA5}">
-                      <a16:colId xmlns:a16="http://schemas.microsoft.com/office/drawing/2014/main" xmlns="" val="3149681256"/>
+                      <a16:colId xmlns:a16="http://schemas.microsoft.com/office/drawing/2014/main" val="3149681256"/>
                     </a:ext>
                   </a:extLst>
                 </a:gridCol>
@@ -13797,7 +13803,7 @@
                 </a:tc>
                 <a:extLst>
                   <a:ext uri="{0D108BD9-81ED-4DB2-BD59-A6C34878D82A}">
-                    <a16:rowId xmlns:a16="http://schemas.microsoft.com/office/drawing/2014/main" xmlns="" val="3087072443"/>
+                    <a16:rowId xmlns:a16="http://schemas.microsoft.com/office/drawing/2014/main" val="3087072443"/>
                   </a:ext>
                 </a:extLst>
               </a:tr>
@@ -13874,7 +13880,7 @@
                 </a:tc>
                 <a:extLst>
                   <a:ext uri="{0D108BD9-81ED-4DB2-BD59-A6C34878D82A}">
-                    <a16:rowId xmlns:a16="http://schemas.microsoft.com/office/drawing/2014/main" xmlns="" val="3363853376"/>
+                    <a16:rowId xmlns:a16="http://schemas.microsoft.com/office/drawing/2014/main" val="3363853376"/>
                   </a:ext>
                 </a:extLst>
               </a:tr>
@@ -13965,7 +13971,7 @@
                 </a:tc>
                 <a:extLst>
                   <a:ext uri="{0D108BD9-81ED-4DB2-BD59-A6C34878D82A}">
-                    <a16:rowId xmlns:a16="http://schemas.microsoft.com/office/drawing/2014/main" xmlns="" val="1596704810"/>
+                    <a16:rowId xmlns:a16="http://schemas.microsoft.com/office/drawing/2014/main" val="1596704810"/>
                   </a:ext>
                 </a:extLst>
               </a:tr>
@@ -14056,7 +14062,7 @@
                 </a:tc>
                 <a:extLst>
                   <a:ext uri="{0D108BD9-81ED-4DB2-BD59-A6C34878D82A}">
-                    <a16:rowId xmlns:a16="http://schemas.microsoft.com/office/drawing/2014/main" xmlns="" val="621665701"/>
+                    <a16:rowId xmlns:a16="http://schemas.microsoft.com/office/drawing/2014/main" val="621665701"/>
                   </a:ext>
                 </a:extLst>
               </a:tr>
@@ -14147,7 +14153,7 @@
                 </a:tc>
                 <a:extLst>
                   <a:ext uri="{0D108BD9-81ED-4DB2-BD59-A6C34878D82A}">
-                    <a16:rowId xmlns:a16="http://schemas.microsoft.com/office/drawing/2014/main" xmlns="" val="1515685180"/>
+                    <a16:rowId xmlns:a16="http://schemas.microsoft.com/office/drawing/2014/main" val="1515685180"/>
                   </a:ext>
                 </a:extLst>
               </a:tr>
@@ -14227,7 +14233,7 @@
                 </a:tc>
                 <a:extLst>
                   <a:ext uri="{0D108BD9-81ED-4DB2-BD59-A6C34878D82A}">
-                    <a16:rowId xmlns:a16="http://schemas.microsoft.com/office/drawing/2014/main" xmlns="" val="2547034353"/>
+                    <a16:rowId xmlns:a16="http://schemas.microsoft.com/office/drawing/2014/main" val="2547034353"/>
                   </a:ext>
                 </a:extLst>
               </a:tr>
@@ -14307,7 +14313,7 @@
                 </a:tc>
                 <a:extLst>
                   <a:ext uri="{0D108BD9-81ED-4DB2-BD59-A6C34878D82A}">
-                    <a16:rowId xmlns:a16="http://schemas.microsoft.com/office/drawing/2014/main" xmlns="" val="3376754302"/>
+                    <a16:rowId xmlns:a16="http://schemas.microsoft.com/office/drawing/2014/main" val="3376754302"/>
                   </a:ext>
                 </a:extLst>
               </a:tr>
@@ -14387,7 +14393,7 @@
                 </a:tc>
                 <a:extLst>
                   <a:ext uri="{0D108BD9-81ED-4DB2-BD59-A6C34878D82A}">
-                    <a16:rowId xmlns:a16="http://schemas.microsoft.com/office/drawing/2014/main" xmlns="" val="242766362"/>
+                    <a16:rowId xmlns:a16="http://schemas.microsoft.com/office/drawing/2014/main" val="242766362"/>
                   </a:ext>
                 </a:extLst>
               </a:tr>
@@ -14446,521 +14452,70 @@
           </a:p>
         </p:txBody>
       </p:sp>
-      <p:grpSp>
-        <p:nvGrpSpPr>
-          <p:cNvPr id="4" name="Group 15"/>
-          <p:cNvGrpSpPr/>
+      <p:sp>
+        <p:nvSpPr>
+          <p:cNvPr id="18" name="TextBox 17"/>
+          <p:cNvSpPr txBox="1"/>
           <p:nvPr/>
-        </p:nvGrpSpPr>
-        <p:grpSpPr>
+        </p:nvSpPr>
+        <p:spPr>
           <a:xfrm>
-            <a:off x="762000" y="1143000"/>
-            <a:ext cx="7467601" cy="4419600"/>
-            <a:chOff x="409434" y="40948"/>
-            <a:chExt cx="11259402" cy="6755641"/>
+            <a:off x="1671206" y="6179134"/>
+            <a:ext cx="5801588" cy="369332"/>
           </a:xfrm>
-        </p:grpSpPr>
-        <p:sp>
-          <p:nvSpPr>
-            <p:cNvPr id="5" name="Left-Right Arrow 4"/>
-            <p:cNvSpPr/>
-            <p:nvPr/>
-          </p:nvSpPr>
-          <p:spPr>
-            <a:xfrm>
-              <a:off x="409434" y="3889617"/>
-              <a:ext cx="11259402" cy="313898"/>
-            </a:xfrm>
-            <a:prstGeom prst="leftRightArrow">
-              <a:avLst/>
-            </a:prstGeom>
-          </p:spPr>
-          <p:style>
-            <a:lnRef idx="2">
-              <a:schemeClr val="accent2">
-                <a:shade val="50000"/>
-              </a:schemeClr>
-            </a:lnRef>
-            <a:fillRef idx="1">
-              <a:schemeClr val="accent2"/>
-            </a:fillRef>
-            <a:effectRef idx="0">
-              <a:schemeClr val="accent2"/>
-            </a:effectRef>
-            <a:fontRef idx="minor">
-              <a:schemeClr val="lt1"/>
-            </a:fontRef>
-          </p:style>
-          <p:txBody>
-            <a:bodyPr rtlCol="0" anchor="ctr"/>
-            <a:lstStyle/>
-            <a:p>
-              <a:pPr algn="ctr"/>
-              <a:endParaRPr lang="en-IN"/>
-            </a:p>
-          </p:txBody>
-        </p:sp>
-        <p:sp>
-          <p:nvSpPr>
-            <p:cNvPr id="6" name="TextBox 5"/>
-            <p:cNvSpPr txBox="1"/>
-            <p:nvPr/>
-          </p:nvSpPr>
-          <p:spPr>
-            <a:xfrm>
-              <a:off x="10160000" y="3587660"/>
-              <a:ext cx="1263593" cy="369332"/>
-            </a:xfrm>
-            <a:prstGeom prst="rect">
-              <a:avLst/>
-            </a:prstGeom>
-            <a:noFill/>
-          </p:spPr>
-          <p:txBody>
-            <a:bodyPr wrap="none" rtlCol="0">
-              <a:spAutoFit/>
-            </a:bodyPr>
-            <a:lstStyle/>
-            <a:p>
-              <a:r>
-                <a:rPr lang="en-IN" dirty="0" smtClean="0">
-                  <a:latin typeface="Times New Roman" panose="02020603050405020304" pitchFamily="18" charset="0"/>
-                  <a:cs typeface="Times New Roman" panose="02020603050405020304" pitchFamily="18" charset="0"/>
-                </a:rPr>
-                <a:t>I2C Bus</a:t>
-              </a:r>
-              <a:endParaRPr lang="en-IN" dirty="0">
-                <a:latin typeface="Times New Roman" panose="02020603050405020304" pitchFamily="18" charset="0"/>
-                <a:cs typeface="Times New Roman" panose="02020603050405020304" pitchFamily="18" charset="0"/>
-              </a:endParaRPr>
-            </a:p>
-          </p:txBody>
-        </p:sp>
-        <p:sp>
-          <p:nvSpPr>
-            <p:cNvPr id="7" name="Rectangle 6"/>
-            <p:cNvSpPr/>
-            <p:nvPr/>
-          </p:nvSpPr>
-          <p:spPr>
-            <a:xfrm>
-              <a:off x="3766783" y="1310190"/>
-              <a:ext cx="2483892" cy="1310185"/>
-            </a:xfrm>
-            <a:prstGeom prst="rect">
-              <a:avLst/>
-            </a:prstGeom>
-          </p:spPr>
-          <p:style>
-            <a:lnRef idx="2">
-              <a:schemeClr val="dk1"/>
-            </a:lnRef>
-            <a:fillRef idx="1">
-              <a:schemeClr val="lt1"/>
-            </a:fillRef>
-            <a:effectRef idx="0">
-              <a:schemeClr val="dk1"/>
-            </a:effectRef>
-            <a:fontRef idx="minor">
-              <a:schemeClr val="dk1"/>
-            </a:fontRef>
-          </p:style>
-          <p:txBody>
-            <a:bodyPr rtlCol="0" anchor="ctr"/>
-            <a:lstStyle/>
-            <a:p>
-              <a:pPr algn="ctr"/>
-              <a:r>
-                <a:rPr lang="en-IN" dirty="0" smtClean="0">
-                  <a:latin typeface="Times New Roman" panose="02020603050405020304" pitchFamily="18" charset="0"/>
-                  <a:cs typeface="Times New Roman" panose="02020603050405020304" pitchFamily="18" charset="0"/>
-                </a:rPr>
-                <a:t>GPS Subsystem</a:t>
-              </a:r>
-              <a:endParaRPr lang="en-IN" dirty="0">
-                <a:latin typeface="Times New Roman" panose="02020603050405020304" pitchFamily="18" charset="0"/>
-                <a:cs typeface="Times New Roman" panose="02020603050405020304" pitchFamily="18" charset="0"/>
-              </a:endParaRPr>
-            </a:p>
-          </p:txBody>
-        </p:sp>
-        <p:cxnSp>
-          <p:nvCxnSpPr>
-            <p:cNvPr id="8" name="Straight Arrow Connector 7"/>
-            <p:cNvCxnSpPr>
-              <a:stCxn id="7" idx="2"/>
-            </p:cNvCxnSpPr>
-            <p:nvPr/>
-          </p:nvCxnSpPr>
-          <p:spPr>
-            <a:xfrm>
-              <a:off x="5008729" y="2620375"/>
-              <a:ext cx="0" cy="1426191"/>
-            </a:xfrm>
-            <a:prstGeom prst="straightConnector1">
-              <a:avLst/>
-            </a:prstGeom>
-            <a:ln>
-              <a:headEnd type="triangle"/>
-              <a:tailEnd type="triangle"/>
-            </a:ln>
-          </p:spPr>
-          <p:style>
-            <a:lnRef idx="1">
-              <a:schemeClr val="dk1"/>
-            </a:lnRef>
-            <a:fillRef idx="0">
-              <a:schemeClr val="dk1"/>
-            </a:fillRef>
-            <a:effectRef idx="0">
-              <a:schemeClr val="dk1"/>
-            </a:effectRef>
-            <a:fontRef idx="minor">
-              <a:schemeClr val="tx1"/>
-            </a:fontRef>
-          </p:style>
-        </p:cxnSp>
-        <p:sp>
-          <p:nvSpPr>
-            <p:cNvPr id="9" name="Rectangle 8"/>
-            <p:cNvSpPr/>
-            <p:nvPr/>
-          </p:nvSpPr>
-          <p:spPr>
-            <a:xfrm>
-              <a:off x="3766783" y="40948"/>
-              <a:ext cx="2483892" cy="846161"/>
-            </a:xfrm>
-            <a:prstGeom prst="rect">
-              <a:avLst/>
-            </a:prstGeom>
-          </p:spPr>
-          <p:style>
-            <a:lnRef idx="2">
-              <a:schemeClr val="dk1"/>
-            </a:lnRef>
-            <a:fillRef idx="1">
-              <a:schemeClr val="lt1"/>
-            </a:fillRef>
-            <a:effectRef idx="0">
-              <a:schemeClr val="dk1"/>
-            </a:effectRef>
-            <a:fontRef idx="minor">
-              <a:schemeClr val="dk1"/>
-            </a:fontRef>
-          </p:style>
-          <p:txBody>
-            <a:bodyPr rtlCol="0" anchor="ctr"/>
-            <a:lstStyle/>
-            <a:p>
-              <a:pPr algn="ctr"/>
-              <a:r>
-                <a:rPr lang="en-IN" dirty="0" smtClean="0">
-                  <a:latin typeface="Times New Roman" panose="02020603050405020304" pitchFamily="18" charset="0"/>
-                  <a:cs typeface="Times New Roman" panose="02020603050405020304" pitchFamily="18" charset="0"/>
-                </a:rPr>
-                <a:t>GPS Receiver</a:t>
-              </a:r>
-              <a:endParaRPr lang="en-IN" dirty="0">
-                <a:latin typeface="Times New Roman" panose="02020603050405020304" pitchFamily="18" charset="0"/>
-                <a:cs typeface="Times New Roman" panose="02020603050405020304" pitchFamily="18" charset="0"/>
-              </a:endParaRPr>
-            </a:p>
-          </p:txBody>
-        </p:sp>
-        <p:cxnSp>
-          <p:nvCxnSpPr>
-            <p:cNvPr id="10" name="Straight Arrow Connector 9"/>
-            <p:cNvCxnSpPr>
-              <a:stCxn id="9" idx="2"/>
-              <a:endCxn id="7" idx="0"/>
-            </p:cNvCxnSpPr>
-            <p:nvPr/>
-          </p:nvCxnSpPr>
-          <p:spPr>
-            <a:xfrm>
-              <a:off x="5008729" y="887109"/>
-              <a:ext cx="0" cy="423081"/>
-            </a:xfrm>
-            <a:prstGeom prst="straightConnector1">
-              <a:avLst/>
-            </a:prstGeom>
-            <a:ln>
-              <a:tailEnd type="triangle"/>
-            </a:ln>
-          </p:spPr>
-          <p:style>
-            <a:lnRef idx="1">
-              <a:schemeClr val="dk1"/>
-            </a:lnRef>
-            <a:fillRef idx="0">
-              <a:schemeClr val="dk1"/>
-            </a:fillRef>
-            <a:effectRef idx="0">
-              <a:schemeClr val="dk1"/>
-            </a:effectRef>
-            <a:fontRef idx="minor">
-              <a:schemeClr val="tx1"/>
-            </a:fontRef>
-          </p:style>
-        </p:cxnSp>
-        <p:sp>
-          <p:nvSpPr>
-            <p:cNvPr id="11" name="Rectangle 10"/>
-            <p:cNvSpPr/>
-            <p:nvPr/>
-          </p:nvSpPr>
-          <p:spPr>
-            <a:xfrm>
-              <a:off x="6851177" y="1310190"/>
-              <a:ext cx="2483892" cy="1310185"/>
-            </a:xfrm>
-            <a:prstGeom prst="rect">
-              <a:avLst/>
-            </a:prstGeom>
-          </p:spPr>
-          <p:style>
-            <a:lnRef idx="2">
-              <a:schemeClr val="dk1"/>
-            </a:lnRef>
-            <a:fillRef idx="1">
-              <a:schemeClr val="lt1"/>
-            </a:fillRef>
-            <a:effectRef idx="0">
-              <a:schemeClr val="dk1"/>
-            </a:effectRef>
-            <a:fontRef idx="minor">
-              <a:schemeClr val="dk1"/>
-            </a:fontRef>
-          </p:style>
-          <p:txBody>
-            <a:bodyPr rtlCol="0" anchor="ctr"/>
-            <a:lstStyle/>
-            <a:p>
-              <a:pPr algn="ctr"/>
-              <a:r>
-                <a:rPr lang="en-IN" dirty="0" smtClean="0">
-                  <a:latin typeface="Times New Roman" panose="02020603050405020304" pitchFamily="18" charset="0"/>
-                  <a:cs typeface="Times New Roman" panose="02020603050405020304" pitchFamily="18" charset="0"/>
-                </a:rPr>
-                <a:t>IMU Subsystem</a:t>
-              </a:r>
-              <a:endParaRPr lang="en-IN" dirty="0">
-                <a:latin typeface="Times New Roman" panose="02020603050405020304" pitchFamily="18" charset="0"/>
-                <a:cs typeface="Times New Roman" panose="02020603050405020304" pitchFamily="18" charset="0"/>
-              </a:endParaRPr>
-            </a:p>
-          </p:txBody>
-        </p:sp>
-        <p:cxnSp>
-          <p:nvCxnSpPr>
-            <p:cNvPr id="12" name="Straight Arrow Connector 11"/>
-            <p:cNvCxnSpPr>
-              <a:stCxn id="11" idx="2"/>
-            </p:cNvCxnSpPr>
-            <p:nvPr/>
-          </p:nvCxnSpPr>
-          <p:spPr>
-            <a:xfrm>
-              <a:off x="8093123" y="2620375"/>
-              <a:ext cx="0" cy="1426191"/>
-            </a:xfrm>
-            <a:prstGeom prst="straightConnector1">
-              <a:avLst/>
-            </a:prstGeom>
-            <a:ln>
-              <a:headEnd type="triangle"/>
-              <a:tailEnd type="triangle"/>
-            </a:ln>
-          </p:spPr>
-          <p:style>
-            <a:lnRef idx="1">
-              <a:schemeClr val="dk1"/>
-            </a:lnRef>
-            <a:fillRef idx="0">
-              <a:schemeClr val="dk1"/>
-            </a:fillRef>
-            <a:effectRef idx="0">
-              <a:schemeClr val="dk1"/>
-            </a:effectRef>
-            <a:fontRef idx="minor">
-              <a:schemeClr val="tx1"/>
-            </a:fontRef>
-          </p:style>
-        </p:cxnSp>
-        <p:sp>
-          <p:nvSpPr>
-            <p:cNvPr id="13" name="Rectangle 12"/>
-            <p:cNvSpPr/>
-            <p:nvPr/>
-          </p:nvSpPr>
-          <p:spPr>
-            <a:xfrm>
-              <a:off x="6851177" y="40948"/>
-              <a:ext cx="2483892" cy="846161"/>
-            </a:xfrm>
-            <a:prstGeom prst="rect">
-              <a:avLst/>
-            </a:prstGeom>
-          </p:spPr>
-          <p:style>
-            <a:lnRef idx="2">
-              <a:schemeClr val="dk1"/>
-            </a:lnRef>
-            <a:fillRef idx="1">
-              <a:schemeClr val="lt1"/>
-            </a:fillRef>
-            <a:effectRef idx="0">
-              <a:schemeClr val="dk1"/>
-            </a:effectRef>
-            <a:fontRef idx="minor">
-              <a:schemeClr val="dk1"/>
-            </a:fontRef>
-          </p:style>
-          <p:txBody>
-            <a:bodyPr rtlCol="0" anchor="ctr"/>
-            <a:lstStyle/>
-            <a:p>
-              <a:pPr algn="ctr"/>
-              <a:r>
-                <a:rPr lang="en-IN" dirty="0" smtClean="0">
-                  <a:latin typeface="Times New Roman" panose="02020603050405020304" pitchFamily="18" charset="0"/>
-                  <a:cs typeface="Times New Roman" panose="02020603050405020304" pitchFamily="18" charset="0"/>
-                </a:rPr>
-                <a:t>IMU Sensor (BNO055)</a:t>
-              </a:r>
-              <a:endParaRPr lang="en-IN" dirty="0">
-                <a:latin typeface="Times New Roman" panose="02020603050405020304" pitchFamily="18" charset="0"/>
-                <a:cs typeface="Times New Roman" panose="02020603050405020304" pitchFamily="18" charset="0"/>
-              </a:endParaRPr>
-            </a:p>
-          </p:txBody>
-        </p:sp>
-        <p:cxnSp>
-          <p:nvCxnSpPr>
-            <p:cNvPr id="14" name="Straight Arrow Connector 13"/>
-            <p:cNvCxnSpPr>
-              <a:stCxn id="13" idx="2"/>
-              <a:endCxn id="11" idx="0"/>
-            </p:cNvCxnSpPr>
-            <p:nvPr/>
-          </p:nvCxnSpPr>
-          <p:spPr>
-            <a:xfrm>
-              <a:off x="8093123" y="887109"/>
-              <a:ext cx="0" cy="423081"/>
-            </a:xfrm>
-            <a:prstGeom prst="straightConnector1">
-              <a:avLst/>
-            </a:prstGeom>
-            <a:ln>
-              <a:tailEnd type="triangle"/>
-            </a:ln>
-          </p:spPr>
-          <p:style>
-            <a:lnRef idx="1">
-              <a:schemeClr val="dk1"/>
-            </a:lnRef>
-            <a:fillRef idx="0">
-              <a:schemeClr val="dk1"/>
-            </a:fillRef>
-            <a:effectRef idx="0">
-              <a:schemeClr val="dk1"/>
-            </a:effectRef>
-            <a:fontRef idx="minor">
-              <a:schemeClr val="tx1"/>
-            </a:fontRef>
-          </p:style>
-        </p:cxnSp>
-        <p:sp>
-          <p:nvSpPr>
-            <p:cNvPr id="15" name="Rectangle 14"/>
-            <p:cNvSpPr/>
-            <p:nvPr/>
-          </p:nvSpPr>
-          <p:spPr>
-            <a:xfrm>
-              <a:off x="4148920" y="5486404"/>
-              <a:ext cx="2483892" cy="1310185"/>
-            </a:xfrm>
-            <a:prstGeom prst="rect">
-              <a:avLst/>
-            </a:prstGeom>
-          </p:spPr>
-          <p:style>
-            <a:lnRef idx="2">
-              <a:schemeClr val="dk1"/>
-            </a:lnRef>
-            <a:fillRef idx="1">
-              <a:schemeClr val="lt1"/>
-            </a:fillRef>
-            <a:effectRef idx="0">
-              <a:schemeClr val="dk1"/>
-            </a:effectRef>
-            <a:fontRef idx="minor">
-              <a:schemeClr val="dk1"/>
-            </a:fontRef>
-          </p:style>
-          <p:txBody>
-            <a:bodyPr rtlCol="0" anchor="ctr"/>
-            <a:lstStyle/>
-            <a:p>
-              <a:pPr algn="ctr"/>
-              <a:r>
-                <a:rPr lang="en-IN" dirty="0" smtClean="0">
-                  <a:latin typeface="Times New Roman" panose="02020603050405020304" pitchFamily="18" charset="0"/>
-                  <a:cs typeface="Times New Roman" panose="02020603050405020304" pitchFamily="18" charset="0"/>
-                </a:rPr>
-                <a:t>Main/Master Controller</a:t>
-              </a:r>
-              <a:endParaRPr lang="en-IN" dirty="0">
-                <a:latin typeface="Times New Roman" panose="02020603050405020304" pitchFamily="18" charset="0"/>
-                <a:cs typeface="Times New Roman" panose="02020603050405020304" pitchFamily="18" charset="0"/>
-              </a:endParaRPr>
-            </a:p>
-          </p:txBody>
-        </p:sp>
-        <p:cxnSp>
-          <p:nvCxnSpPr>
-            <p:cNvPr id="16" name="Straight Arrow Connector 15"/>
-            <p:cNvCxnSpPr>
-              <a:stCxn id="15" idx="0"/>
-            </p:cNvCxnSpPr>
-            <p:nvPr/>
-          </p:nvCxnSpPr>
-          <p:spPr>
-            <a:xfrm flipV="1">
-              <a:off x="5390866" y="4046566"/>
-              <a:ext cx="0" cy="1439838"/>
-            </a:xfrm>
-            <a:prstGeom prst="straightConnector1">
-              <a:avLst/>
-            </a:prstGeom>
-            <a:ln>
-              <a:headEnd type="triangle"/>
-              <a:tailEnd type="triangle"/>
-            </a:ln>
-          </p:spPr>
-          <p:style>
-            <a:lnRef idx="1">
-              <a:schemeClr val="dk1"/>
-            </a:lnRef>
-            <a:fillRef idx="0">
-              <a:schemeClr val="dk1"/>
-            </a:fillRef>
-            <a:effectRef idx="0">
-              <a:schemeClr val="dk1"/>
-            </a:effectRef>
-            <a:fontRef idx="minor">
-              <a:schemeClr val="tx1"/>
-            </a:fontRef>
-          </p:style>
-        </p:cxnSp>
-      </p:grpSp>
+          <a:prstGeom prst="rect">
+            <a:avLst/>
+          </a:prstGeom>
+          <a:noFill/>
+        </p:spPr>
+        <p:txBody>
+          <a:bodyPr wrap="none" rtlCol="0">
+            <a:spAutoFit/>
+          </a:bodyPr>
+          <a:lstStyle/>
+          <a:p>
+            <a:r>
+              <a:rPr lang="en-IN" dirty="0" smtClean="0">
+                <a:latin typeface="Arial" panose="020B0604020202020204" pitchFamily="34" charset="0"/>
+                <a:cs typeface="Arial" panose="020B0604020202020204" pitchFamily="34" charset="0"/>
+              </a:rPr>
+              <a:t>Fig 2. Block Diagram of Currently implemented System</a:t>
+            </a:r>
+            <a:endParaRPr lang="en-IN" dirty="0">
+              <a:latin typeface="Arial" panose="020B0604020202020204" pitchFamily="34" charset="0"/>
+              <a:cs typeface="Arial" panose="020B0604020202020204" pitchFamily="34" charset="0"/>
+            </a:endParaRPr>
+          </a:p>
+        </p:txBody>
+      </p:sp>
+      <p:pic>
+        <p:nvPicPr>
+          <p:cNvPr id="2" name="Picture 1"/>
+          <p:cNvPicPr>
+            <a:picLocks noChangeAspect="1"/>
+          </p:cNvPicPr>
+          <p:nvPr/>
+        </p:nvPicPr>
+        <p:blipFill>
+          <a:blip r:embed="rId2"/>
+          <a:stretch>
+            <a:fillRect/>
+          </a:stretch>
+        </p:blipFill>
+        <p:spPr>
+          <a:xfrm>
+            <a:off x="874532" y="1519984"/>
+            <a:ext cx="7394937" cy="4434565"/>
+          </a:xfrm>
+          <a:prstGeom prst="rect">
+            <a:avLst/>
+          </a:prstGeom>
+        </p:spPr>
+      </p:pic>
     </p:spTree>
     <p:extLst>
       <p:ext uri="{BB962C8B-B14F-4D97-AF65-F5344CB8AC3E}">
-        <p14:creationId xmlns:p14="http://schemas.microsoft.com/office/powerpoint/2010/main" xmlns="" val="3942412419"/>
+        <p14:creationId xmlns:p14="http://schemas.microsoft.com/office/powerpoint/2010/main" val="3942412419"/>
       </p:ext>
     </p:extLst>
   </p:cSld>
@@ -14989,29 +14544,6 @@
       </p:grpSpPr>
       <p:sp>
         <p:nvSpPr>
-          <p:cNvPr id="2" name="Content Placeholder 1"/>
-          <p:cNvSpPr>
-            <a:spLocks noGrp="1"/>
-          </p:cNvSpPr>
-          <p:nvPr>
-            <p:ph idx="1"/>
-          </p:nvPr>
-        </p:nvSpPr>
-        <p:spPr/>
-        <p:txBody>
-          <a:bodyPr/>
-          <a:lstStyle/>
-          <a:p>
-            <a:r>
-              <a:rPr lang="en-IN" dirty="0" smtClean="0"/>
-              <a:t>Current Status of development. (Output and status can be changed if we get any output and obtain result before our presentation)</a:t>
-            </a:r>
-            <a:endParaRPr lang="en-IN" dirty="0"/>
-          </a:p>
-        </p:txBody>
-      </p:sp>
-      <p:sp>
-        <p:nvSpPr>
           <p:cNvPr id="3" name="Content Placeholder 2"/>
           <p:cNvSpPr>
             <a:spLocks noGrp="1"/>
@@ -15032,16 +14564,76 @@
           <a:p>
             <a:r>
               <a:rPr lang="en-IN" dirty="0" smtClean="0"/>
-              <a:t>Results and Output</a:t>
+              <a:t>Current Status</a:t>
             </a:r>
             <a:endParaRPr lang="en-IN" dirty="0"/>
+          </a:p>
+        </p:txBody>
+      </p:sp>
+      <p:sp>
+        <p:nvSpPr>
+          <p:cNvPr id="4" name="Content Placeholder 3"/>
+          <p:cNvSpPr>
+            <a:spLocks noGrp="1"/>
+          </p:cNvSpPr>
+          <p:nvPr>
+            <p:ph idx="1"/>
+          </p:nvPr>
+        </p:nvSpPr>
+        <p:spPr/>
+        <p:txBody>
+          <a:bodyPr/>
+          <a:lstStyle/>
+          <a:p>
+            <a:pPr algn="just">
+              <a:buFont typeface="Arial" panose="020B0604020202020204" pitchFamily="34" charset="0"/>
+              <a:buChar char="•"/>
+            </a:pPr>
+            <a:r>
+              <a:rPr lang="en-IN" dirty="0" smtClean="0"/>
+              <a:t>Main Controller – MSP432P401R</a:t>
+            </a:r>
+          </a:p>
+          <a:p>
+            <a:pPr algn="just">
+              <a:buFont typeface="Arial" panose="020B0604020202020204" pitchFamily="34" charset="0"/>
+              <a:buChar char="•"/>
+            </a:pPr>
+            <a:r>
+              <a:rPr lang="en-IN" dirty="0" smtClean="0"/>
+              <a:t>Absolute Position Subsystem – Arduino Due (Static GPS Position due to non-availability of GPS Module)</a:t>
+            </a:r>
+          </a:p>
+          <a:p>
+            <a:pPr algn="just">
+              <a:buFont typeface="Arial" panose="020B0604020202020204" pitchFamily="34" charset="0"/>
+              <a:buChar char="•"/>
+            </a:pPr>
+            <a:r>
+              <a:rPr lang="en-IN" dirty="0" smtClean="0"/>
+              <a:t>Relative Position Subsystem – Arduino Due with BNO055 (Sensor was malfunctioning due to age. Hence static values were given)</a:t>
+            </a:r>
+          </a:p>
+          <a:p>
+            <a:pPr algn="just">
+              <a:buFont typeface="Arial" panose="020B0604020202020204" pitchFamily="34" charset="0"/>
+              <a:buChar char="•"/>
+            </a:pPr>
+            <a:endParaRPr lang="en-IN" dirty="0"/>
+          </a:p>
+          <a:p>
+            <a:pPr marL="0" indent="0" algn="just"/>
+            <a:r>
+              <a:rPr lang="en-IN" dirty="0" smtClean="0"/>
+              <a:t>Communication between different Sub-systems is implemented in code</a:t>
+            </a:r>
           </a:p>
         </p:txBody>
       </p:sp>
     </p:spTree>
     <p:extLst>
       <p:ext uri="{BB962C8B-B14F-4D97-AF65-F5344CB8AC3E}">
-        <p14:creationId xmlns:p14="http://schemas.microsoft.com/office/powerpoint/2010/main" xmlns="" val="3838819336"/>
+        <p14:creationId xmlns:p14="http://schemas.microsoft.com/office/powerpoint/2010/main" val="3909560456"/>
       </p:ext>
     </p:extLst>
   </p:cSld>
@@ -15070,7 +14662,35 @@
       </p:grpSpPr>
       <p:sp>
         <p:nvSpPr>
-          <p:cNvPr id="2" name="Content Placeholder 1"/>
+          <p:cNvPr id="3" name="Content Placeholder 2"/>
+          <p:cNvSpPr>
+            <a:spLocks noGrp="1"/>
+          </p:cNvSpPr>
+          <p:nvPr>
+            <p:ph sz="quarter" idx="10"/>
+          </p:nvPr>
+        </p:nvSpPr>
+        <p:spPr>
+          <a:xfrm>
+            <a:off x="304800" y="-17206"/>
+            <a:ext cx="6324600" cy="1143000"/>
+          </a:xfrm>
+        </p:spPr>
+        <p:txBody>
+          <a:bodyPr/>
+          <a:lstStyle/>
+          <a:p>
+            <a:r>
+              <a:rPr lang="en-IN" dirty="0" smtClean="0"/>
+              <a:t>Results and Output</a:t>
+            </a:r>
+            <a:endParaRPr lang="en-IN" dirty="0"/>
+          </a:p>
+        </p:txBody>
+      </p:sp>
+      <p:sp>
+        <p:nvSpPr>
+          <p:cNvPr id="4" name="Content Placeholder 3"/>
           <p:cNvSpPr>
             <a:spLocks noGrp="1"/>
           </p:cNvSpPr>
@@ -15083,38 +14703,77 @@
           <a:bodyPr/>
           <a:lstStyle/>
           <a:p>
+            <a:pPr algn="just">
+              <a:buFont typeface="Arial" panose="020B0604020202020204" pitchFamily="34" charset="0"/>
+              <a:buChar char="•"/>
+            </a:pPr>
             <a:r>
               <a:rPr lang="en-IN" dirty="0" smtClean="0"/>
-              <a:t>Points complementing the data given in Aim and Objectives slide</a:t>
-            </a:r>
+              <a:t>Currently, the architecture design is completed with major sub-systems. Some of the sub-systems design is completed.</a:t>
+            </a:r>
+          </a:p>
+          <a:p>
+            <a:pPr algn="just">
+              <a:buFont typeface="Arial" panose="020B0604020202020204" pitchFamily="34" charset="0"/>
+              <a:buChar char="•"/>
+            </a:pPr>
+            <a:r>
+              <a:rPr lang="en-IN" dirty="0" smtClean="0"/>
+              <a:t>GPS Subsystem library is created to attach with generic GPS module </a:t>
+            </a:r>
+          </a:p>
+          <a:p>
+            <a:pPr algn="just">
+              <a:buFont typeface="Arial" panose="020B0604020202020204" pitchFamily="34" charset="0"/>
+              <a:buChar char="•"/>
+            </a:pPr>
+            <a:r>
+              <a:rPr lang="en-IN" dirty="0" smtClean="0"/>
+              <a:t>Relative Position Subsystem library is created to attach with BNO055 sensor</a:t>
+            </a:r>
+          </a:p>
+          <a:p>
+            <a:pPr algn="just">
+              <a:buFont typeface="Arial" panose="020B0604020202020204" pitchFamily="34" charset="0"/>
+              <a:buChar char="•"/>
+            </a:pPr>
             <a:endParaRPr lang="en-IN" dirty="0"/>
           </a:p>
-        </p:txBody>
-      </p:sp>
-      <p:sp>
-        <p:nvSpPr>
-          <p:cNvPr id="3" name="Content Placeholder 2"/>
-          <p:cNvSpPr>
-            <a:spLocks noGrp="1"/>
-          </p:cNvSpPr>
-          <p:nvPr>
-            <p:ph sz="quarter" idx="10"/>
-          </p:nvPr>
-        </p:nvSpPr>
-        <p:spPr>
-          <a:xfrm>
-            <a:off x="304800" y="0"/>
-            <a:ext cx="6324600" cy="1143000"/>
-          </a:xfrm>
-        </p:spPr>
-        <p:txBody>
-          <a:bodyPr/>
-          <a:lstStyle/>
-          <a:p>
+          <a:p>
+            <a:pPr marL="0" indent="0" algn="just"/>
             <a:r>
               <a:rPr lang="en-IN" dirty="0" smtClean="0"/>
-              <a:t>Conclusion</a:t>
-            </a:r>
+              <a:t>All the Codes and Documentation is checked-in at GitHub repo. </a:t>
+            </a:r>
+          </a:p>
+          <a:p>
+            <a:pPr marL="0" indent="0" algn="just"/>
+            <a:r>
+              <a:rPr lang="en-IN" dirty="0" smtClean="0"/>
+              <a:t>Repo : </a:t>
+            </a:r>
+            <a:r>
+              <a:rPr lang="en-IN" dirty="0">
+                <a:hlinkClick r:id="rId2"/>
+              </a:rPr>
+              <a:t>jeevaraam/</a:t>
+            </a:r>
+            <a:r>
+              <a:rPr lang="en-IN" dirty="0" err="1">
+                <a:hlinkClick r:id="rId2"/>
+              </a:rPr>
+              <a:t>AutoDrone</a:t>
+            </a:r>
+            <a:r>
+              <a:rPr lang="en-IN" dirty="0">
+                <a:hlinkClick r:id="rId2"/>
+              </a:rPr>
+              <a:t> (github.com)</a:t>
+            </a:r>
+            <a:endParaRPr lang="en-IN" dirty="0" smtClean="0"/>
+          </a:p>
+          <a:p>
+            <a:pPr marL="0" indent="0" algn="just"/>
             <a:endParaRPr lang="en-IN" dirty="0"/>
           </a:p>
         </p:txBody>
@@ -15122,7 +14781,7 @@
     </p:spTree>
     <p:extLst>
       <p:ext uri="{BB962C8B-B14F-4D97-AF65-F5344CB8AC3E}">
-        <p14:creationId xmlns:p14="http://schemas.microsoft.com/office/powerpoint/2010/main" xmlns="" val="1784680704"/>
+        <p14:creationId xmlns:p14="http://schemas.microsoft.com/office/powerpoint/2010/main" val="3838819336"/>
       </p:ext>
     </p:extLst>
   </p:cSld>
@@ -15255,35 +14914,10 @@
           <a:bodyPr/>
           <a:lstStyle/>
           <a:p>
-            <a:pPr algn="just">
-              <a:buFont typeface="Arial" panose="020B0604020202020204" pitchFamily="34" charset="0"/>
-              <a:buChar char="•"/>
-            </a:pPr>
-            <a:r>
-              <a:rPr lang="en-US" dirty="0"/>
-              <a:t>In this architecture, additional features can also be added since the communication bus is I2C and the master controller can be configured after adding the additional subsystems to the bus and integrated with the system easily</a:t>
-            </a:r>
-            <a:r>
-              <a:rPr lang="en-US" dirty="0" smtClean="0"/>
-              <a:t>.</a:t>
-            </a:r>
-          </a:p>
-          <a:p>
-            <a:pPr algn="just">
-              <a:buFont typeface="Arial" panose="020B0604020202020204" pitchFamily="34" charset="0"/>
-              <a:buChar char="•"/>
-            </a:pPr>
-            <a:r>
-              <a:rPr lang="en-IN" dirty="0"/>
-              <a:t>At the end, the Master controller combines all the inputs from multiple subsystems and takes decision based on its configuration input</a:t>
-            </a:r>
             <a:r>
               <a:rPr lang="en-IN" dirty="0" smtClean="0"/>
-              <a:t>.</a:t>
-            </a:r>
-            <a:endParaRPr lang="en-US" dirty="0"/>
-          </a:p>
-          <a:p>
+              <a:t>Points complementing the data given in Aim and Objectives slide</a:t>
+            </a:r>
             <a:endParaRPr lang="en-IN" dirty="0"/>
           </a:p>
         </p:txBody>
@@ -15300,7 +14934,7 @@
         </p:nvSpPr>
         <p:spPr>
           <a:xfrm>
-            <a:off x="304800" y="-2458"/>
+            <a:off x="304800" y="0"/>
             <a:ext cx="6324600" cy="1143000"/>
           </a:xfrm>
         </p:spPr>
@@ -15310,7 +14944,7 @@
           <a:p>
             <a:r>
               <a:rPr lang="en-IN" dirty="0" smtClean="0"/>
-              <a:t>Future Scope</a:t>
+              <a:t>Conclusion</a:t>
             </a:r>
             <a:endParaRPr lang="en-IN" dirty="0"/>
           </a:p>
@@ -15319,7 +14953,7 @@
     </p:spTree>
     <p:extLst>
       <p:ext uri="{BB962C8B-B14F-4D97-AF65-F5344CB8AC3E}">
-        <p14:creationId xmlns:p14="http://schemas.microsoft.com/office/powerpoint/2010/main" xmlns="" val="2373973929"/>
+        <p14:creationId xmlns:p14="http://schemas.microsoft.com/office/powerpoint/2010/main" val="1784680704"/>
       </p:ext>
     </p:extLst>
   </p:cSld>
@@ -15353,6 +14987,112 @@
             <a:spLocks noGrp="1"/>
           </p:cNvSpPr>
           <p:nvPr>
+            <p:ph idx="1"/>
+          </p:nvPr>
+        </p:nvSpPr>
+        <p:spPr/>
+        <p:txBody>
+          <a:bodyPr/>
+          <a:lstStyle/>
+          <a:p>
+            <a:pPr algn="just">
+              <a:buFont typeface="Arial" panose="020B0604020202020204" pitchFamily="34" charset="0"/>
+              <a:buChar char="•"/>
+            </a:pPr>
+            <a:r>
+              <a:rPr lang="en-US" dirty="0"/>
+              <a:t>In this architecture, additional features can also be added since the communication bus is I2C and the master controller can be configured after adding the additional subsystems to the bus and integrated with the system easily</a:t>
+            </a:r>
+            <a:r>
+              <a:rPr lang="en-US" dirty="0" smtClean="0"/>
+              <a:t>.</a:t>
+            </a:r>
+          </a:p>
+          <a:p>
+            <a:pPr algn="just">
+              <a:buFont typeface="Arial" panose="020B0604020202020204" pitchFamily="34" charset="0"/>
+              <a:buChar char="•"/>
+            </a:pPr>
+            <a:r>
+              <a:rPr lang="en-IN" dirty="0"/>
+              <a:t>At the end, the Master controller combines all the inputs from multiple subsystems and takes decision based on its configuration input</a:t>
+            </a:r>
+            <a:r>
+              <a:rPr lang="en-IN" dirty="0" smtClean="0"/>
+              <a:t>.</a:t>
+            </a:r>
+            <a:endParaRPr lang="en-US" dirty="0"/>
+          </a:p>
+          <a:p>
+            <a:endParaRPr lang="en-IN" dirty="0"/>
+          </a:p>
+        </p:txBody>
+      </p:sp>
+      <p:sp>
+        <p:nvSpPr>
+          <p:cNvPr id="3" name="Content Placeholder 2"/>
+          <p:cNvSpPr>
+            <a:spLocks noGrp="1"/>
+          </p:cNvSpPr>
+          <p:nvPr>
+            <p:ph sz="quarter" idx="10"/>
+          </p:nvPr>
+        </p:nvSpPr>
+        <p:spPr>
+          <a:xfrm>
+            <a:off x="304800" y="-2458"/>
+            <a:ext cx="6324600" cy="1143000"/>
+          </a:xfrm>
+        </p:spPr>
+        <p:txBody>
+          <a:bodyPr/>
+          <a:lstStyle/>
+          <a:p>
+            <a:r>
+              <a:rPr lang="en-IN" dirty="0" smtClean="0"/>
+              <a:t>Future Scope</a:t>
+            </a:r>
+            <a:endParaRPr lang="en-IN" dirty="0"/>
+          </a:p>
+        </p:txBody>
+      </p:sp>
+    </p:spTree>
+    <p:extLst>
+      <p:ext uri="{BB962C8B-B14F-4D97-AF65-F5344CB8AC3E}">
+        <p14:creationId xmlns:p14="http://schemas.microsoft.com/office/powerpoint/2010/main" val="2373973929"/>
+      </p:ext>
+    </p:extLst>
+  </p:cSld>
+  <p:clrMapOvr>
+    <a:masterClrMapping/>
+  </p:clrMapOvr>
+</p:sld>
+</file>
+
+<file path=ppt/slides/slide22.xml><?xml version="1.0" encoding="utf-8"?>
+<p:sld xmlns:a="http://schemas.openxmlformats.org/drawingml/2006/main" xmlns:r="http://schemas.openxmlformats.org/officeDocument/2006/relationships" xmlns:p="http://schemas.openxmlformats.org/presentationml/2006/main">
+  <p:cSld>
+    <p:spTree>
+      <p:nvGrpSpPr>
+        <p:cNvPr id="1" name=""/>
+        <p:cNvGrpSpPr/>
+        <p:nvPr/>
+      </p:nvGrpSpPr>
+      <p:grpSpPr>
+        <a:xfrm>
+          <a:off x="0" y="0"/>
+          <a:ext cx="0" cy="0"/>
+          <a:chOff x="0" y="0"/>
+          <a:chExt cx="0" cy="0"/>
+        </a:xfrm>
+      </p:grpSpPr>
+      <p:sp>
+        <p:nvSpPr>
+          <p:cNvPr id="2" name="Content Placeholder 1"/>
+          <p:cNvSpPr>
+            <a:spLocks noGrp="1"/>
+          </p:cNvSpPr>
+          <p:nvPr>
             <p:ph sz="quarter" idx="10"/>
           </p:nvPr>
         </p:nvSpPr>
@@ -15373,7 +15113,7 @@
     </p:spTree>
     <p:extLst>
       <p:ext uri="{BB962C8B-B14F-4D97-AF65-F5344CB8AC3E}">
-        <p14:creationId xmlns:p14="http://schemas.microsoft.com/office/powerpoint/2010/main" xmlns="" val="2025879996"/>
+        <p14:creationId xmlns:p14="http://schemas.microsoft.com/office/powerpoint/2010/main" val="2025879996"/>
       </p:ext>
     </p:extLst>
   </p:cSld>
@@ -15556,7 +15296,7 @@
     </p:spTree>
     <p:extLst>
       <p:ext uri="{BB962C8B-B14F-4D97-AF65-F5344CB8AC3E}">
-        <p14:creationId xmlns:p14="http://schemas.microsoft.com/office/powerpoint/2010/main" xmlns="" val="3726065294"/>
+        <p14:creationId xmlns:p14="http://schemas.microsoft.com/office/powerpoint/2010/main" val="3726065294"/>
       </p:ext>
     </p:extLst>
   </p:cSld>
@@ -15778,10 +15518,11 @@
         </p:spPr>
         <p:txBody>
           <a:bodyPr>
-            <a:normAutofit fontScale="85000" lnSpcReduction="10000"/>
+            <a:normAutofit fontScale="92500" lnSpcReduction="10000"/>
           </a:bodyPr>
           <a:lstStyle/>
           <a:p>
+            <a:pPr algn="just"/>
             <a:r>
               <a:rPr lang="en-IN" b="1" dirty="0" smtClean="0"/>
               <a:t>Aim</a:t>
@@ -15791,8 +15532,17 @@
             <a:pPr algn="just"/>
             <a:r>
               <a:rPr lang="en-IN" dirty="0" smtClean="0"/>
-              <a:t>	To design a drone that can travel on its own from one place to another, Hence Auto-Drone.</a:t>
-            </a:r>
+              <a:t>	To design a drone that can travel on its own from one place to </a:t>
+            </a:r>
+            <a:r>
+              <a:rPr lang="en-IN" dirty="0" smtClean="0"/>
+              <a:t>another</a:t>
+            </a:r>
+            <a:r>
+              <a:rPr lang="en-IN" dirty="0"/>
+              <a:t>.</a:t>
+            </a:r>
+            <a:endParaRPr lang="en-IN" dirty="0" smtClean="0"/>
           </a:p>
           <a:p>
             <a:pPr algn="just"/>
@@ -15806,7 +15556,7 @@
             </a:r>
           </a:p>
           <a:p>
-            <a:pPr>
+            <a:pPr algn="just">
               <a:buFont typeface="Arial" pitchFamily="34" charset="0"/>
               <a:buChar char="•"/>
             </a:pPr>
@@ -15817,7 +15567,7 @@
             <a:endParaRPr lang="en-US" dirty="0" smtClean="0"/>
           </a:p>
           <a:p>
-            <a:pPr>
+            <a:pPr algn="just">
               <a:buFont typeface="Arial" pitchFamily="34" charset="0"/>
               <a:buChar char="•"/>
             </a:pPr>
@@ -15828,7 +15578,7 @@
             <a:endParaRPr lang="en-US" dirty="0" smtClean="0"/>
           </a:p>
           <a:p>
-            <a:pPr>
+            <a:pPr algn="just">
               <a:buFont typeface="Arial" pitchFamily="34" charset="0"/>
               <a:buChar char="•"/>
             </a:pPr>
@@ -15839,59 +15589,40 @@
             <a:endParaRPr lang="en-US" dirty="0" smtClean="0"/>
           </a:p>
           <a:p>
-            <a:pPr>
+            <a:pPr algn="just">
               <a:buFont typeface="Arial" pitchFamily="34" charset="0"/>
               <a:buChar char="•"/>
             </a:pPr>
             <a:r>
               <a:rPr lang="en-IN" dirty="0" smtClean="0"/>
-              <a:t>To implement Main Controller program corresponding to above architecture</a:t>
+              <a:t>To implement Main Controller program corresponding to above </a:t>
+            </a:r>
+            <a:r>
+              <a:rPr lang="en-IN" dirty="0" smtClean="0"/>
+              <a:t>architecture</a:t>
             </a:r>
           </a:p>
           <a:p>
             <a:pPr algn="just">
-              <a:buFont typeface="Arial" panose="020B0604020202020204" pitchFamily="34" charset="0"/>
+              <a:buFont typeface="Arial" pitchFamily="34" charset="0"/>
               <a:buChar char="•"/>
             </a:pPr>
             <a:r>
               <a:rPr lang="en-IN" dirty="0" smtClean="0"/>
-              <a:t>To make the subsystems work with the main frame.</a:t>
-            </a:r>
+              <a:t>To interface the Subsystems with Main Controller using Interface Protocol</a:t>
+            </a:r>
+            <a:endParaRPr lang="en-IN" dirty="0" smtClean="0"/>
           </a:p>
           <a:p>
             <a:pPr algn="just">
-              <a:buFont typeface="Arial" panose="020B0604020202020204" pitchFamily="34" charset="0"/>
-              <a:buChar char="•"/>
-            </a:pPr>
-            <a:r>
-              <a:rPr lang="en-IN" dirty="0" smtClean="0"/>
-              <a:t>To identify the shortest path between the destination and source.</a:t>
-            </a:r>
-          </a:p>
-          <a:p>
-            <a:pPr algn="just">
-              <a:buFont typeface="Arial" panose="020B0604020202020204" pitchFamily="34" charset="0"/>
-              <a:buChar char="•"/>
-            </a:pPr>
-            <a:r>
-              <a:rPr lang="en-IN" dirty="0" smtClean="0"/>
-              <a:t>To tackle the obstacles using AI.</a:t>
-            </a:r>
-          </a:p>
-          <a:p>
-            <a:pPr algn="just"/>
-            <a:endParaRPr lang="en-IN" dirty="0" smtClean="0"/>
-          </a:p>
-          <a:p>
-            <a:pPr algn="just">
-              <a:buFont typeface="Arial" panose="020B0604020202020204" pitchFamily="34" charset="0"/>
+              <a:buFont typeface="Arial" pitchFamily="34" charset="0"/>
               <a:buChar char="•"/>
             </a:pPr>
             <a:endParaRPr lang="en-IN" dirty="0" smtClean="0"/>
           </a:p>
           <a:p>
             <a:pPr algn="just">
-              <a:buFont typeface="Arial" panose="020B0604020202020204" pitchFamily="34" charset="0"/>
+              <a:buFont typeface="Arial" pitchFamily="34" charset="0"/>
               <a:buChar char="•"/>
             </a:pPr>
             <a:endParaRPr lang="en-IN" dirty="0" smtClean="0"/>
@@ -15929,7 +15660,7 @@
     </p:spTree>
     <p:extLst>
       <p:ext uri="{BB962C8B-B14F-4D97-AF65-F5344CB8AC3E}">
-        <p14:creationId xmlns:p14="http://schemas.microsoft.com/office/powerpoint/2010/main" xmlns="" val="428068872"/>
+        <p14:creationId xmlns:p14="http://schemas.microsoft.com/office/powerpoint/2010/main" val="428068872"/>
       </p:ext>
     </p:extLst>
   </p:cSld>
@@ -15984,10 +15715,102 @@
           </a:p>
         </p:txBody>
       </p:sp>
+      <p:sp>
+        <p:nvSpPr>
+          <p:cNvPr id="4" name="TextBox 3"/>
+          <p:cNvSpPr txBox="1"/>
+          <p:nvPr/>
+        </p:nvSpPr>
+        <p:spPr>
+          <a:xfrm>
+            <a:off x="381000" y="914400"/>
+            <a:ext cx="8077200" cy="3785652"/>
+          </a:xfrm>
+          <a:prstGeom prst="rect">
+            <a:avLst/>
+          </a:prstGeom>
+          <a:noFill/>
+        </p:spPr>
+        <p:txBody>
+          <a:bodyPr wrap="square" rtlCol="0">
+            <a:spAutoFit/>
+          </a:bodyPr>
+          <a:lstStyle/>
+          <a:p>
+            <a:pPr marL="342900" indent="-342900" algn="just">
+              <a:buFont typeface="Arial" panose="020B0604020202020204" pitchFamily="34" charset="0"/>
+              <a:buChar char="•"/>
+            </a:pPr>
+            <a:r>
+              <a:rPr lang="en-IN" sz="2400" dirty="0" smtClean="0">
+                <a:latin typeface="Times New Roman" pitchFamily="18" charset="0"/>
+                <a:cs typeface="Times New Roman" pitchFamily="18" charset="0"/>
+              </a:rPr>
+              <a:t>Inspired by Electronic Subsystems in automobiles</a:t>
+            </a:r>
+          </a:p>
+          <a:p>
+            <a:pPr marL="342900" indent="-342900" algn="just">
+              <a:buFont typeface="Arial" panose="020B0604020202020204" pitchFamily="34" charset="0"/>
+              <a:buChar char="•"/>
+            </a:pPr>
+            <a:r>
+              <a:rPr lang="en-IN" sz="2400" dirty="0" smtClean="0">
+                <a:latin typeface="Times New Roman" pitchFamily="18" charset="0"/>
+                <a:cs typeface="Times New Roman" pitchFamily="18" charset="0"/>
+              </a:rPr>
+              <a:t>Basic Architecture is designed to maintain interoperability with various devices and keep the design open-ended</a:t>
+            </a:r>
+          </a:p>
+          <a:p>
+            <a:pPr marL="342900" indent="-342900" algn="just">
+              <a:buFont typeface="Arial" panose="020B0604020202020204" pitchFamily="34" charset="0"/>
+              <a:buChar char="•"/>
+            </a:pPr>
+            <a:r>
+              <a:rPr lang="en-IN" sz="2400" dirty="0" smtClean="0">
+                <a:latin typeface="Times New Roman" pitchFamily="18" charset="0"/>
+                <a:cs typeface="Times New Roman" pitchFamily="18" charset="0"/>
+              </a:rPr>
+              <a:t>Every work is carried out by individual sub-systems to ensure distributed workloads and also isolate failures to a specific sub-system</a:t>
+            </a:r>
+          </a:p>
+          <a:p>
+            <a:pPr marL="342900" indent="-342900" algn="just">
+              <a:buFont typeface="Arial" panose="020B0604020202020204" pitchFamily="34" charset="0"/>
+              <a:buChar char="•"/>
+            </a:pPr>
+            <a:r>
+              <a:rPr lang="en-IN" sz="2400" dirty="0" smtClean="0">
+                <a:latin typeface="Times New Roman" pitchFamily="18" charset="0"/>
+                <a:cs typeface="Times New Roman" pitchFamily="18" charset="0"/>
+              </a:rPr>
+              <a:t>Main Controller collects the parameters from different sub-systems and takes decision based on the collected data</a:t>
+            </a:r>
+          </a:p>
+          <a:p>
+            <a:pPr marL="342900" indent="-342900" algn="just">
+              <a:buFont typeface="Arial" panose="020B0604020202020204" pitchFamily="34" charset="0"/>
+              <a:buChar char="•"/>
+            </a:pPr>
+            <a:r>
+              <a:rPr lang="en-IN" sz="2400" dirty="0" smtClean="0">
+                <a:latin typeface="Times New Roman" pitchFamily="18" charset="0"/>
+                <a:cs typeface="Times New Roman" pitchFamily="18" charset="0"/>
+              </a:rPr>
+              <a:t>Output is produced that mimics an RC Controller so that existing drones can be easily retro-fitted</a:t>
+            </a:r>
+            <a:endParaRPr lang="en-US" sz="2400" dirty="0">
+              <a:latin typeface="Times New Roman" pitchFamily="18" charset="0"/>
+              <a:cs typeface="Times New Roman" pitchFamily="18" charset="0"/>
+            </a:endParaRPr>
+          </a:p>
+        </p:txBody>
+      </p:sp>
     </p:spTree>
     <p:extLst>
       <p:ext uri="{BB962C8B-B14F-4D97-AF65-F5344CB8AC3E}">
-        <p14:creationId xmlns:p14="http://schemas.microsoft.com/office/powerpoint/2010/main" xmlns="" val="4187894375"/>
+        <p14:creationId xmlns:p14="http://schemas.microsoft.com/office/powerpoint/2010/main" val="4187894375"/>
       </p:ext>
     </p:extLst>
   </p:cSld>
@@ -16014,1005 +15837,6 @@
           <a:chExt cx="0" cy="0"/>
         </a:xfrm>
       </p:grpSpPr>
-      <p:grpSp>
-        <p:nvGrpSpPr>
-          <p:cNvPr id="4" name="Group 3"/>
-          <p:cNvGrpSpPr/>
-          <p:nvPr/>
-        </p:nvGrpSpPr>
-        <p:grpSpPr>
-          <a:xfrm>
-            <a:off x="381000" y="1143000"/>
-            <a:ext cx="8379626" cy="5181600"/>
-            <a:chOff x="409434" y="34120"/>
-            <a:chExt cx="12839792" cy="6762469"/>
-          </a:xfrm>
-        </p:grpSpPr>
-        <p:sp>
-          <p:nvSpPr>
-            <p:cNvPr id="5" name="Rectangle 4"/>
-            <p:cNvSpPr/>
-            <p:nvPr/>
-          </p:nvSpPr>
-          <p:spPr>
-            <a:xfrm>
-              <a:off x="4148920" y="5486404"/>
-              <a:ext cx="2483892" cy="1310185"/>
-            </a:xfrm>
-            <a:prstGeom prst="rect">
-              <a:avLst/>
-            </a:prstGeom>
-          </p:spPr>
-          <p:style>
-            <a:lnRef idx="2">
-              <a:schemeClr val="dk1"/>
-            </a:lnRef>
-            <a:fillRef idx="1">
-              <a:schemeClr val="lt1"/>
-            </a:fillRef>
-            <a:effectRef idx="0">
-              <a:schemeClr val="dk1"/>
-            </a:effectRef>
-            <a:fontRef idx="minor">
-              <a:schemeClr val="dk1"/>
-            </a:fontRef>
-          </p:style>
-          <p:txBody>
-            <a:bodyPr rtlCol="0" anchor="ctr"/>
-            <a:lstStyle/>
-            <a:p>
-              <a:pPr algn="ctr"/>
-              <a:r>
-                <a:rPr lang="en-IN" dirty="0" smtClean="0">
-                  <a:latin typeface="Times New Roman" panose="02020603050405020304" pitchFamily="18" charset="0"/>
-                  <a:cs typeface="Times New Roman" panose="02020603050405020304" pitchFamily="18" charset="0"/>
-                </a:rPr>
-                <a:t>Main/Master Controller</a:t>
-              </a:r>
-              <a:endParaRPr lang="en-IN" dirty="0">
-                <a:latin typeface="Times New Roman" panose="02020603050405020304" pitchFamily="18" charset="0"/>
-                <a:cs typeface="Times New Roman" panose="02020603050405020304" pitchFamily="18" charset="0"/>
-              </a:endParaRPr>
-            </a:p>
-          </p:txBody>
-        </p:sp>
-        <p:sp>
-          <p:nvSpPr>
-            <p:cNvPr id="6" name="Rectangle 5"/>
-            <p:cNvSpPr/>
-            <p:nvPr/>
-          </p:nvSpPr>
-          <p:spPr>
-            <a:xfrm>
-              <a:off x="409434" y="1310190"/>
-              <a:ext cx="2483892" cy="1310185"/>
-            </a:xfrm>
-            <a:prstGeom prst="rect">
-              <a:avLst/>
-            </a:prstGeom>
-          </p:spPr>
-          <p:style>
-            <a:lnRef idx="2">
-              <a:schemeClr val="dk1"/>
-            </a:lnRef>
-            <a:fillRef idx="1">
-              <a:schemeClr val="lt1"/>
-            </a:fillRef>
-            <a:effectRef idx="0">
-              <a:schemeClr val="dk1"/>
-            </a:effectRef>
-            <a:fontRef idx="minor">
-              <a:schemeClr val="dk1"/>
-            </a:fontRef>
-          </p:style>
-          <p:txBody>
-            <a:bodyPr rtlCol="0" anchor="ctr"/>
-            <a:lstStyle/>
-            <a:p>
-              <a:pPr algn="ctr"/>
-              <a:r>
-                <a:rPr lang="en-IN" dirty="0" smtClean="0">
-                  <a:latin typeface="Times New Roman" panose="02020603050405020304" pitchFamily="18" charset="0"/>
-                  <a:cs typeface="Times New Roman" panose="02020603050405020304" pitchFamily="18" charset="0"/>
-                </a:rPr>
-                <a:t>Obstacle Avoidance Subsystem</a:t>
-              </a:r>
-              <a:endParaRPr lang="en-IN" dirty="0">
-                <a:latin typeface="Times New Roman" panose="02020603050405020304" pitchFamily="18" charset="0"/>
-                <a:cs typeface="Times New Roman" panose="02020603050405020304" pitchFamily="18" charset="0"/>
-              </a:endParaRPr>
-            </a:p>
-          </p:txBody>
-        </p:sp>
-        <p:sp>
-          <p:nvSpPr>
-            <p:cNvPr id="7" name="Rectangle 6"/>
-            <p:cNvSpPr/>
-            <p:nvPr/>
-          </p:nvSpPr>
-          <p:spPr>
-            <a:xfrm>
-              <a:off x="3766783" y="1310190"/>
-              <a:ext cx="2483892" cy="1310185"/>
-            </a:xfrm>
-            <a:prstGeom prst="rect">
-              <a:avLst/>
-            </a:prstGeom>
-          </p:spPr>
-          <p:style>
-            <a:lnRef idx="2">
-              <a:schemeClr val="dk1"/>
-            </a:lnRef>
-            <a:fillRef idx="1">
-              <a:schemeClr val="lt1"/>
-            </a:fillRef>
-            <a:effectRef idx="0">
-              <a:schemeClr val="dk1"/>
-            </a:effectRef>
-            <a:fontRef idx="minor">
-              <a:schemeClr val="dk1"/>
-            </a:fontRef>
-          </p:style>
-          <p:txBody>
-            <a:bodyPr rtlCol="0" anchor="ctr"/>
-            <a:lstStyle/>
-            <a:p>
-              <a:pPr algn="ctr"/>
-              <a:r>
-                <a:rPr lang="en-IN" dirty="0" smtClean="0">
-                  <a:latin typeface="Times New Roman" panose="02020603050405020304" pitchFamily="18" charset="0"/>
-                  <a:cs typeface="Times New Roman" panose="02020603050405020304" pitchFamily="18" charset="0"/>
-                </a:rPr>
-                <a:t>Automated Driving Subsystem</a:t>
-              </a:r>
-              <a:endParaRPr lang="en-IN" dirty="0">
-                <a:latin typeface="Times New Roman" panose="02020603050405020304" pitchFamily="18" charset="0"/>
-                <a:cs typeface="Times New Roman" panose="02020603050405020304" pitchFamily="18" charset="0"/>
-              </a:endParaRPr>
-            </a:p>
-          </p:txBody>
-        </p:sp>
-        <p:sp>
-          <p:nvSpPr>
-            <p:cNvPr id="8" name="Rectangle 7"/>
-            <p:cNvSpPr/>
-            <p:nvPr/>
-          </p:nvSpPr>
-          <p:spPr>
-            <a:xfrm>
-              <a:off x="7124132" y="1310189"/>
-              <a:ext cx="2483892" cy="1310185"/>
-            </a:xfrm>
-            <a:prstGeom prst="rect">
-              <a:avLst/>
-            </a:prstGeom>
-          </p:spPr>
-          <p:style>
-            <a:lnRef idx="2">
-              <a:schemeClr val="dk1"/>
-            </a:lnRef>
-            <a:fillRef idx="1">
-              <a:schemeClr val="lt1"/>
-            </a:fillRef>
-            <a:effectRef idx="0">
-              <a:schemeClr val="dk1"/>
-            </a:effectRef>
-            <a:fontRef idx="minor">
-              <a:schemeClr val="dk1"/>
-            </a:fontRef>
-          </p:style>
-          <p:txBody>
-            <a:bodyPr rtlCol="0" anchor="ctr"/>
-            <a:lstStyle/>
-            <a:p>
-              <a:pPr algn="ctr"/>
-              <a:r>
-                <a:rPr lang="en-IN" dirty="0" smtClean="0">
-                  <a:latin typeface="Times New Roman" panose="02020603050405020304" pitchFamily="18" charset="0"/>
-                  <a:cs typeface="Times New Roman" panose="02020603050405020304" pitchFamily="18" charset="0"/>
-                </a:rPr>
-                <a:t>Communication Subsystem</a:t>
-              </a:r>
-              <a:endParaRPr lang="en-IN" dirty="0">
-                <a:latin typeface="Times New Roman" panose="02020603050405020304" pitchFamily="18" charset="0"/>
-                <a:cs typeface="Times New Roman" panose="02020603050405020304" pitchFamily="18" charset="0"/>
-              </a:endParaRPr>
-            </a:p>
-          </p:txBody>
-        </p:sp>
-        <p:sp>
-          <p:nvSpPr>
-            <p:cNvPr id="9" name="Left-Right Arrow 8"/>
-            <p:cNvSpPr/>
-            <p:nvPr/>
-          </p:nvSpPr>
-          <p:spPr>
-            <a:xfrm>
-              <a:off x="409434" y="3889617"/>
-              <a:ext cx="11259402" cy="313898"/>
-            </a:xfrm>
-            <a:prstGeom prst="leftRightArrow">
-              <a:avLst/>
-            </a:prstGeom>
-          </p:spPr>
-          <p:style>
-            <a:lnRef idx="2">
-              <a:schemeClr val="accent2">
-                <a:shade val="50000"/>
-              </a:schemeClr>
-            </a:lnRef>
-            <a:fillRef idx="1">
-              <a:schemeClr val="accent2"/>
-            </a:fillRef>
-            <a:effectRef idx="0">
-              <a:schemeClr val="accent2"/>
-            </a:effectRef>
-            <a:fontRef idx="minor">
-              <a:schemeClr val="lt1"/>
-            </a:fontRef>
-          </p:style>
-          <p:txBody>
-            <a:bodyPr rtlCol="0" anchor="ctr"/>
-            <a:lstStyle/>
-            <a:p>
-              <a:pPr algn="ctr"/>
-              <a:endParaRPr lang="en-IN"/>
-            </a:p>
-          </p:txBody>
-        </p:sp>
-        <p:cxnSp>
-          <p:nvCxnSpPr>
-            <p:cNvPr id="10" name="Straight Arrow Connector 9"/>
-            <p:cNvCxnSpPr>
-              <a:stCxn id="5" idx="0"/>
-            </p:cNvCxnSpPr>
-            <p:nvPr/>
-          </p:nvCxnSpPr>
-          <p:spPr>
-            <a:xfrm flipV="1">
-              <a:off x="5390866" y="4046566"/>
-              <a:ext cx="0" cy="1439838"/>
-            </a:xfrm>
-            <a:prstGeom prst="straightConnector1">
-              <a:avLst/>
-            </a:prstGeom>
-            <a:ln>
-              <a:headEnd type="triangle"/>
-              <a:tailEnd type="triangle"/>
-            </a:ln>
-          </p:spPr>
-          <p:style>
-            <a:lnRef idx="1">
-              <a:schemeClr val="dk1"/>
-            </a:lnRef>
-            <a:fillRef idx="0">
-              <a:schemeClr val="dk1"/>
-            </a:fillRef>
-            <a:effectRef idx="0">
-              <a:schemeClr val="dk1"/>
-            </a:effectRef>
-            <a:fontRef idx="minor">
-              <a:schemeClr val="tx1"/>
-            </a:fontRef>
-          </p:style>
-        </p:cxnSp>
-        <p:cxnSp>
-          <p:nvCxnSpPr>
-            <p:cNvPr id="11" name="Straight Arrow Connector 10"/>
-            <p:cNvCxnSpPr>
-              <a:stCxn id="7" idx="2"/>
-            </p:cNvCxnSpPr>
-            <p:nvPr/>
-          </p:nvCxnSpPr>
-          <p:spPr>
-            <a:xfrm>
-              <a:off x="5008729" y="2620375"/>
-              <a:ext cx="0" cy="1426191"/>
-            </a:xfrm>
-            <a:prstGeom prst="straightConnector1">
-              <a:avLst/>
-            </a:prstGeom>
-            <a:ln>
-              <a:headEnd type="triangle"/>
-              <a:tailEnd type="triangle"/>
-            </a:ln>
-          </p:spPr>
-          <p:style>
-            <a:lnRef idx="1">
-              <a:schemeClr val="dk1"/>
-            </a:lnRef>
-            <a:fillRef idx="0">
-              <a:schemeClr val="dk1"/>
-            </a:fillRef>
-            <a:effectRef idx="0">
-              <a:schemeClr val="dk1"/>
-            </a:effectRef>
-            <a:fontRef idx="minor">
-              <a:schemeClr val="tx1"/>
-            </a:fontRef>
-          </p:style>
-        </p:cxnSp>
-        <p:cxnSp>
-          <p:nvCxnSpPr>
-            <p:cNvPr id="12" name="Straight Arrow Connector 11"/>
-            <p:cNvCxnSpPr>
-              <a:stCxn id="6" idx="2"/>
-            </p:cNvCxnSpPr>
-            <p:nvPr/>
-          </p:nvCxnSpPr>
-          <p:spPr>
-            <a:xfrm>
-              <a:off x="1651380" y="2620375"/>
-              <a:ext cx="0" cy="1426191"/>
-            </a:xfrm>
-            <a:prstGeom prst="straightConnector1">
-              <a:avLst/>
-            </a:prstGeom>
-            <a:ln>
-              <a:tailEnd type="triangle"/>
-            </a:ln>
-          </p:spPr>
-          <p:style>
-            <a:lnRef idx="1">
-              <a:schemeClr val="dk1"/>
-            </a:lnRef>
-            <a:fillRef idx="0">
-              <a:schemeClr val="dk1"/>
-            </a:fillRef>
-            <a:effectRef idx="0">
-              <a:schemeClr val="dk1"/>
-            </a:effectRef>
-            <a:fontRef idx="minor">
-              <a:schemeClr val="tx1"/>
-            </a:fontRef>
-          </p:style>
-        </p:cxnSp>
-        <p:cxnSp>
-          <p:nvCxnSpPr>
-            <p:cNvPr id="13" name="Straight Arrow Connector 12"/>
-            <p:cNvCxnSpPr>
-              <a:stCxn id="8" idx="2"/>
-            </p:cNvCxnSpPr>
-            <p:nvPr/>
-          </p:nvCxnSpPr>
-          <p:spPr>
-            <a:xfrm>
-              <a:off x="8366078" y="2620374"/>
-              <a:ext cx="0" cy="1426192"/>
-            </a:xfrm>
-            <a:prstGeom prst="straightConnector1">
-              <a:avLst/>
-            </a:prstGeom>
-            <a:ln>
-              <a:headEnd type="triangle"/>
-              <a:tailEnd type="triangle"/>
-            </a:ln>
-          </p:spPr>
-          <p:style>
-            <a:lnRef idx="1">
-              <a:schemeClr val="dk1"/>
-            </a:lnRef>
-            <a:fillRef idx="0">
-              <a:schemeClr val="dk1"/>
-            </a:fillRef>
-            <a:effectRef idx="0">
-              <a:schemeClr val="dk1"/>
-            </a:effectRef>
-            <a:fontRef idx="minor">
-              <a:schemeClr val="tx1"/>
-            </a:fontRef>
-          </p:style>
-        </p:cxnSp>
-        <p:sp>
-          <p:nvSpPr>
-            <p:cNvPr id="14" name="Rectangle 13"/>
-            <p:cNvSpPr/>
-            <p:nvPr/>
-          </p:nvSpPr>
-          <p:spPr>
-            <a:xfrm>
-              <a:off x="409434" y="34120"/>
-              <a:ext cx="2483892" cy="846161"/>
-            </a:xfrm>
-            <a:prstGeom prst="rect">
-              <a:avLst/>
-            </a:prstGeom>
-          </p:spPr>
-          <p:style>
-            <a:lnRef idx="2">
-              <a:schemeClr val="dk1"/>
-            </a:lnRef>
-            <a:fillRef idx="1">
-              <a:schemeClr val="lt1"/>
-            </a:fillRef>
-            <a:effectRef idx="0">
-              <a:schemeClr val="dk1"/>
-            </a:effectRef>
-            <a:fontRef idx="minor">
-              <a:schemeClr val="dk1"/>
-            </a:fontRef>
-          </p:style>
-          <p:txBody>
-            <a:bodyPr rtlCol="0" anchor="ctr"/>
-            <a:lstStyle/>
-            <a:p>
-              <a:pPr algn="ctr"/>
-              <a:r>
-                <a:rPr lang="en-IN" sz="1600" dirty="0" smtClean="0">
-                  <a:latin typeface="Times New Roman" panose="02020603050405020304" pitchFamily="18" charset="0"/>
-                  <a:cs typeface="Times New Roman" panose="02020603050405020304" pitchFamily="18" charset="0"/>
-                </a:rPr>
-                <a:t>LIDAR/Ultrasonic Sensor System</a:t>
-              </a:r>
-              <a:endParaRPr lang="en-IN" sz="1600" dirty="0">
-                <a:latin typeface="Times New Roman" panose="02020603050405020304" pitchFamily="18" charset="0"/>
-                <a:cs typeface="Times New Roman" panose="02020603050405020304" pitchFamily="18" charset="0"/>
-              </a:endParaRPr>
-            </a:p>
-          </p:txBody>
-        </p:sp>
-        <p:sp>
-          <p:nvSpPr>
-            <p:cNvPr id="15" name="Rectangle 14"/>
-            <p:cNvSpPr/>
-            <p:nvPr/>
-          </p:nvSpPr>
-          <p:spPr>
-            <a:xfrm>
-              <a:off x="3766783" y="40948"/>
-              <a:ext cx="2483892" cy="846161"/>
-            </a:xfrm>
-            <a:prstGeom prst="rect">
-              <a:avLst/>
-            </a:prstGeom>
-          </p:spPr>
-          <p:style>
-            <a:lnRef idx="2">
-              <a:schemeClr val="dk1"/>
-            </a:lnRef>
-            <a:fillRef idx="1">
-              <a:schemeClr val="lt1"/>
-            </a:fillRef>
-            <a:effectRef idx="0">
-              <a:schemeClr val="dk1"/>
-            </a:effectRef>
-            <a:fontRef idx="minor">
-              <a:schemeClr val="dk1"/>
-            </a:fontRef>
-          </p:style>
-          <p:txBody>
-            <a:bodyPr rtlCol="0" anchor="ctr"/>
-            <a:lstStyle/>
-            <a:p>
-              <a:pPr algn="ctr"/>
-              <a:r>
-                <a:rPr lang="en-IN" dirty="0" smtClean="0">
-                  <a:latin typeface="Times New Roman" panose="02020603050405020304" pitchFamily="18" charset="0"/>
-                  <a:cs typeface="Times New Roman" panose="02020603050405020304" pitchFamily="18" charset="0"/>
-                </a:rPr>
-                <a:t>GPS and IMU Units</a:t>
-              </a:r>
-              <a:endParaRPr lang="en-IN" dirty="0">
-                <a:latin typeface="Times New Roman" panose="02020603050405020304" pitchFamily="18" charset="0"/>
-                <a:cs typeface="Times New Roman" panose="02020603050405020304" pitchFamily="18" charset="0"/>
-              </a:endParaRPr>
-            </a:p>
-          </p:txBody>
-        </p:sp>
-        <p:sp>
-          <p:nvSpPr>
-            <p:cNvPr id="16" name="Rectangle 15"/>
-            <p:cNvSpPr/>
-            <p:nvPr/>
-          </p:nvSpPr>
-          <p:spPr>
-            <a:xfrm>
-              <a:off x="7124132" y="40948"/>
-              <a:ext cx="2483892" cy="846161"/>
-            </a:xfrm>
-            <a:prstGeom prst="rect">
-              <a:avLst/>
-            </a:prstGeom>
-          </p:spPr>
-          <p:style>
-            <a:lnRef idx="2">
-              <a:schemeClr val="dk1"/>
-            </a:lnRef>
-            <a:fillRef idx="1">
-              <a:schemeClr val="lt1"/>
-            </a:fillRef>
-            <a:effectRef idx="0">
-              <a:schemeClr val="dk1"/>
-            </a:effectRef>
-            <a:fontRef idx="minor">
-              <a:schemeClr val="dk1"/>
-            </a:fontRef>
-          </p:style>
-          <p:txBody>
-            <a:bodyPr rtlCol="0" anchor="ctr"/>
-            <a:lstStyle/>
-            <a:p>
-              <a:pPr algn="ctr"/>
-              <a:r>
-                <a:rPr lang="en-IN" dirty="0" smtClean="0">
-                  <a:latin typeface="Times New Roman" panose="02020603050405020304" pitchFamily="18" charset="0"/>
-                  <a:cs typeface="Times New Roman" panose="02020603050405020304" pitchFamily="18" charset="0"/>
-                </a:rPr>
-                <a:t>Wi-Fi</a:t>
-              </a:r>
-              <a:endParaRPr lang="en-IN" dirty="0">
-                <a:latin typeface="Times New Roman" panose="02020603050405020304" pitchFamily="18" charset="0"/>
-                <a:cs typeface="Times New Roman" panose="02020603050405020304" pitchFamily="18" charset="0"/>
-              </a:endParaRPr>
-            </a:p>
-          </p:txBody>
-        </p:sp>
-        <p:cxnSp>
-          <p:nvCxnSpPr>
-            <p:cNvPr id="17" name="Straight Arrow Connector 16"/>
-            <p:cNvCxnSpPr>
-              <a:stCxn id="14" idx="2"/>
-              <a:endCxn id="6" idx="0"/>
-            </p:cNvCxnSpPr>
-            <p:nvPr/>
-          </p:nvCxnSpPr>
-          <p:spPr>
-            <a:xfrm>
-              <a:off x="1651380" y="880281"/>
-              <a:ext cx="0" cy="429909"/>
-            </a:xfrm>
-            <a:prstGeom prst="straightConnector1">
-              <a:avLst/>
-            </a:prstGeom>
-            <a:ln>
-              <a:tailEnd type="triangle"/>
-            </a:ln>
-          </p:spPr>
-          <p:style>
-            <a:lnRef idx="1">
-              <a:schemeClr val="dk1"/>
-            </a:lnRef>
-            <a:fillRef idx="0">
-              <a:schemeClr val="dk1"/>
-            </a:fillRef>
-            <a:effectRef idx="0">
-              <a:schemeClr val="dk1"/>
-            </a:effectRef>
-            <a:fontRef idx="minor">
-              <a:schemeClr val="tx1"/>
-            </a:fontRef>
-          </p:style>
-        </p:cxnSp>
-        <p:cxnSp>
-          <p:nvCxnSpPr>
-            <p:cNvPr id="18" name="Straight Arrow Connector 17"/>
-            <p:cNvCxnSpPr>
-              <a:stCxn id="15" idx="2"/>
-              <a:endCxn id="7" idx="0"/>
-            </p:cNvCxnSpPr>
-            <p:nvPr/>
-          </p:nvCxnSpPr>
-          <p:spPr>
-            <a:xfrm>
-              <a:off x="5008729" y="887109"/>
-              <a:ext cx="0" cy="423081"/>
-            </a:xfrm>
-            <a:prstGeom prst="straightConnector1">
-              <a:avLst/>
-            </a:prstGeom>
-            <a:ln>
-              <a:tailEnd type="triangle"/>
-            </a:ln>
-          </p:spPr>
-          <p:style>
-            <a:lnRef idx="1">
-              <a:schemeClr val="dk1"/>
-            </a:lnRef>
-            <a:fillRef idx="0">
-              <a:schemeClr val="dk1"/>
-            </a:fillRef>
-            <a:effectRef idx="0">
-              <a:schemeClr val="dk1"/>
-            </a:effectRef>
-            <a:fontRef idx="minor">
-              <a:schemeClr val="tx1"/>
-            </a:fontRef>
-          </p:style>
-        </p:cxnSp>
-        <p:cxnSp>
-          <p:nvCxnSpPr>
-            <p:cNvPr id="19" name="Straight Arrow Connector 18"/>
-            <p:cNvCxnSpPr>
-              <a:stCxn id="16" idx="2"/>
-              <a:endCxn id="8" idx="0"/>
-            </p:cNvCxnSpPr>
-            <p:nvPr/>
-          </p:nvCxnSpPr>
-          <p:spPr>
-            <a:xfrm>
-              <a:off x="8366078" y="887109"/>
-              <a:ext cx="0" cy="423080"/>
-            </a:xfrm>
-            <a:prstGeom prst="straightConnector1">
-              <a:avLst/>
-            </a:prstGeom>
-            <a:ln>
-              <a:tailEnd type="triangle"/>
-            </a:ln>
-          </p:spPr>
-          <p:style>
-            <a:lnRef idx="1">
-              <a:schemeClr val="dk1"/>
-            </a:lnRef>
-            <a:fillRef idx="0">
-              <a:schemeClr val="dk1"/>
-            </a:fillRef>
-            <a:effectRef idx="0">
-              <a:schemeClr val="dk1"/>
-            </a:effectRef>
-            <a:fontRef idx="minor">
-              <a:schemeClr val="tx1"/>
-            </a:fontRef>
-          </p:style>
-        </p:cxnSp>
-        <p:sp>
-          <p:nvSpPr>
-            <p:cNvPr id="20" name="TextBox 19"/>
-            <p:cNvSpPr txBox="1"/>
-            <p:nvPr/>
-          </p:nvSpPr>
-          <p:spPr>
-            <a:xfrm>
-              <a:off x="10100386" y="3514803"/>
-              <a:ext cx="947696" cy="369332"/>
-            </a:xfrm>
-            <a:prstGeom prst="rect">
-              <a:avLst/>
-            </a:prstGeom>
-            <a:noFill/>
-          </p:spPr>
-          <p:txBody>
-            <a:bodyPr wrap="none" rtlCol="0">
-              <a:spAutoFit/>
-            </a:bodyPr>
-            <a:lstStyle/>
-            <a:p>
-              <a:r>
-                <a:rPr lang="en-IN" dirty="0" smtClean="0">
-                  <a:latin typeface="Times New Roman" panose="02020603050405020304" pitchFamily="18" charset="0"/>
-                  <a:cs typeface="Times New Roman" panose="02020603050405020304" pitchFamily="18" charset="0"/>
-                </a:rPr>
-                <a:t>I2C Bus</a:t>
-              </a:r>
-              <a:endParaRPr lang="en-IN" dirty="0">
-                <a:latin typeface="Times New Roman" panose="02020603050405020304" pitchFamily="18" charset="0"/>
-                <a:cs typeface="Times New Roman" panose="02020603050405020304" pitchFamily="18" charset="0"/>
-              </a:endParaRPr>
-            </a:p>
-          </p:txBody>
-        </p:sp>
-        <p:cxnSp>
-          <p:nvCxnSpPr>
-            <p:cNvPr id="21" name="Straight Arrow Connector 20"/>
-            <p:cNvCxnSpPr/>
-            <p:nvPr/>
-          </p:nvCxnSpPr>
-          <p:spPr>
-            <a:xfrm>
-              <a:off x="6632812" y="5677469"/>
-              <a:ext cx="1228298" cy="0"/>
-            </a:xfrm>
-            <a:prstGeom prst="straightConnector1">
-              <a:avLst/>
-            </a:prstGeom>
-            <a:ln>
-              <a:tailEnd type="triangle"/>
-            </a:ln>
-          </p:spPr>
-          <p:style>
-            <a:lnRef idx="1">
-              <a:schemeClr val="dk1"/>
-            </a:lnRef>
-            <a:fillRef idx="0">
-              <a:schemeClr val="dk1"/>
-            </a:fillRef>
-            <a:effectRef idx="0">
-              <a:schemeClr val="dk1"/>
-            </a:effectRef>
-            <a:fontRef idx="minor">
-              <a:schemeClr val="tx1"/>
-            </a:fontRef>
-          </p:style>
-        </p:cxnSp>
-        <p:cxnSp>
-          <p:nvCxnSpPr>
-            <p:cNvPr id="22" name="Straight Arrow Connector 21"/>
-            <p:cNvCxnSpPr/>
-            <p:nvPr/>
-          </p:nvCxnSpPr>
-          <p:spPr>
-            <a:xfrm>
-              <a:off x="6632812" y="5964072"/>
-              <a:ext cx="1228298" cy="0"/>
-            </a:xfrm>
-            <a:prstGeom prst="straightConnector1">
-              <a:avLst/>
-            </a:prstGeom>
-            <a:ln>
-              <a:tailEnd type="triangle"/>
-            </a:ln>
-          </p:spPr>
-          <p:style>
-            <a:lnRef idx="1">
-              <a:schemeClr val="dk1"/>
-            </a:lnRef>
-            <a:fillRef idx="0">
-              <a:schemeClr val="dk1"/>
-            </a:fillRef>
-            <a:effectRef idx="0">
-              <a:schemeClr val="dk1"/>
-            </a:effectRef>
-            <a:fontRef idx="minor">
-              <a:schemeClr val="tx1"/>
-            </a:fontRef>
-          </p:style>
-        </p:cxnSp>
-        <p:cxnSp>
-          <p:nvCxnSpPr>
-            <p:cNvPr id="23" name="Straight Arrow Connector 22"/>
-            <p:cNvCxnSpPr/>
-            <p:nvPr/>
-          </p:nvCxnSpPr>
-          <p:spPr>
-            <a:xfrm>
-              <a:off x="6632812" y="6264323"/>
-              <a:ext cx="1228298" cy="0"/>
-            </a:xfrm>
-            <a:prstGeom prst="straightConnector1">
-              <a:avLst/>
-            </a:prstGeom>
-            <a:ln>
-              <a:tailEnd type="triangle"/>
-            </a:ln>
-          </p:spPr>
-          <p:style>
-            <a:lnRef idx="1">
-              <a:schemeClr val="dk1"/>
-            </a:lnRef>
-            <a:fillRef idx="0">
-              <a:schemeClr val="dk1"/>
-            </a:fillRef>
-            <a:effectRef idx="0">
-              <a:schemeClr val="dk1"/>
-            </a:effectRef>
-            <a:fontRef idx="minor">
-              <a:schemeClr val="tx1"/>
-            </a:fontRef>
-          </p:style>
-        </p:cxnSp>
-        <p:cxnSp>
-          <p:nvCxnSpPr>
-            <p:cNvPr id="24" name="Straight Arrow Connector 23"/>
-            <p:cNvCxnSpPr/>
-            <p:nvPr/>
-          </p:nvCxnSpPr>
-          <p:spPr>
-            <a:xfrm>
-              <a:off x="6632812" y="6537278"/>
-              <a:ext cx="1228298" cy="0"/>
-            </a:xfrm>
-            <a:prstGeom prst="straightConnector1">
-              <a:avLst/>
-            </a:prstGeom>
-            <a:ln>
-              <a:tailEnd type="triangle"/>
-            </a:ln>
-          </p:spPr>
-          <p:style>
-            <a:lnRef idx="1">
-              <a:schemeClr val="dk1"/>
-            </a:lnRef>
-            <a:fillRef idx="0">
-              <a:schemeClr val="dk1"/>
-            </a:fillRef>
-            <a:effectRef idx="0">
-              <a:schemeClr val="dk1"/>
-            </a:effectRef>
-            <a:fontRef idx="minor">
-              <a:schemeClr val="tx1"/>
-            </a:fontRef>
-          </p:style>
-        </p:cxnSp>
-        <p:sp>
-          <p:nvSpPr>
-            <p:cNvPr id="25" name="TextBox 24"/>
-            <p:cNvSpPr txBox="1"/>
-            <p:nvPr/>
-          </p:nvSpPr>
-          <p:spPr>
-            <a:xfrm>
-              <a:off x="7891076" y="5492803"/>
-              <a:ext cx="966931" cy="369332"/>
-            </a:xfrm>
-            <a:prstGeom prst="rect">
-              <a:avLst/>
-            </a:prstGeom>
-            <a:noFill/>
-          </p:spPr>
-          <p:txBody>
-            <a:bodyPr wrap="none" rtlCol="0">
-              <a:spAutoFit/>
-            </a:bodyPr>
-            <a:lstStyle/>
-            <a:p>
-              <a:r>
-                <a:rPr lang="en-IN" dirty="0" smtClean="0">
-                  <a:latin typeface="Times New Roman" panose="02020603050405020304" pitchFamily="18" charset="0"/>
-                  <a:cs typeface="Times New Roman" panose="02020603050405020304" pitchFamily="18" charset="0"/>
-                </a:rPr>
-                <a:t>Elevator</a:t>
-              </a:r>
-              <a:endParaRPr lang="en-IN" dirty="0">
-                <a:latin typeface="Times New Roman" panose="02020603050405020304" pitchFamily="18" charset="0"/>
-                <a:cs typeface="Times New Roman" panose="02020603050405020304" pitchFamily="18" charset="0"/>
-              </a:endParaRPr>
-            </a:p>
-          </p:txBody>
-        </p:sp>
-        <p:sp>
-          <p:nvSpPr>
-            <p:cNvPr id="26" name="TextBox 25"/>
-            <p:cNvSpPr txBox="1"/>
-            <p:nvPr/>
-          </p:nvSpPr>
-          <p:spPr>
-            <a:xfrm>
-              <a:off x="7891076" y="5779406"/>
-              <a:ext cx="864339" cy="369332"/>
-            </a:xfrm>
-            <a:prstGeom prst="rect">
-              <a:avLst/>
-            </a:prstGeom>
-            <a:noFill/>
-          </p:spPr>
-          <p:txBody>
-            <a:bodyPr wrap="none" rtlCol="0">
-              <a:spAutoFit/>
-            </a:bodyPr>
-            <a:lstStyle/>
-            <a:p>
-              <a:r>
-                <a:rPr lang="en-IN" dirty="0" smtClean="0">
-                  <a:latin typeface="Times New Roman" panose="02020603050405020304" pitchFamily="18" charset="0"/>
-                  <a:cs typeface="Times New Roman" panose="02020603050405020304" pitchFamily="18" charset="0"/>
-                </a:rPr>
-                <a:t>Rudder</a:t>
-              </a:r>
-              <a:endParaRPr lang="en-IN" dirty="0">
-                <a:latin typeface="Times New Roman" panose="02020603050405020304" pitchFamily="18" charset="0"/>
-                <a:cs typeface="Times New Roman" panose="02020603050405020304" pitchFamily="18" charset="0"/>
-              </a:endParaRPr>
-            </a:p>
-          </p:txBody>
-        </p:sp>
-        <p:sp>
-          <p:nvSpPr>
-            <p:cNvPr id="27" name="TextBox 26"/>
-            <p:cNvSpPr txBox="1"/>
-            <p:nvPr/>
-          </p:nvSpPr>
-          <p:spPr>
-            <a:xfrm>
-              <a:off x="7891076" y="6079657"/>
-              <a:ext cx="889987" cy="369332"/>
-            </a:xfrm>
-            <a:prstGeom prst="rect">
-              <a:avLst/>
-            </a:prstGeom>
-            <a:noFill/>
-          </p:spPr>
-          <p:txBody>
-            <a:bodyPr wrap="none" rtlCol="0">
-              <a:spAutoFit/>
-            </a:bodyPr>
-            <a:lstStyle/>
-            <a:p>
-              <a:r>
-                <a:rPr lang="en-IN" dirty="0" smtClean="0">
-                  <a:latin typeface="Times New Roman" panose="02020603050405020304" pitchFamily="18" charset="0"/>
-                  <a:cs typeface="Times New Roman" panose="02020603050405020304" pitchFamily="18" charset="0"/>
-                </a:rPr>
-                <a:t>Aileron</a:t>
-              </a:r>
-              <a:endParaRPr lang="en-IN" dirty="0">
-                <a:latin typeface="Times New Roman" panose="02020603050405020304" pitchFamily="18" charset="0"/>
-                <a:cs typeface="Times New Roman" panose="02020603050405020304" pitchFamily="18" charset="0"/>
-              </a:endParaRPr>
-            </a:p>
-          </p:txBody>
-        </p:sp>
-        <p:sp>
-          <p:nvSpPr>
-            <p:cNvPr id="28" name="TextBox 27"/>
-            <p:cNvSpPr txBox="1"/>
-            <p:nvPr/>
-          </p:nvSpPr>
-          <p:spPr>
-            <a:xfrm>
-              <a:off x="7891076" y="6352612"/>
-              <a:ext cx="928459" cy="369332"/>
-            </a:xfrm>
-            <a:prstGeom prst="rect">
-              <a:avLst/>
-            </a:prstGeom>
-            <a:noFill/>
-          </p:spPr>
-          <p:txBody>
-            <a:bodyPr wrap="none" rtlCol="0">
-              <a:spAutoFit/>
-            </a:bodyPr>
-            <a:lstStyle/>
-            <a:p>
-              <a:r>
-                <a:rPr lang="en-IN" dirty="0" smtClean="0">
-                  <a:latin typeface="Times New Roman" panose="02020603050405020304" pitchFamily="18" charset="0"/>
-                  <a:cs typeface="Times New Roman" panose="02020603050405020304" pitchFamily="18" charset="0"/>
-                </a:rPr>
-                <a:t>Throttle</a:t>
-              </a:r>
-              <a:endParaRPr lang="en-IN" dirty="0">
-                <a:latin typeface="Times New Roman" panose="02020603050405020304" pitchFamily="18" charset="0"/>
-                <a:cs typeface="Times New Roman" panose="02020603050405020304" pitchFamily="18" charset="0"/>
-              </a:endParaRPr>
-            </a:p>
-          </p:txBody>
-        </p:sp>
-        <p:sp>
-          <p:nvSpPr>
-            <p:cNvPr id="29" name="TextBox 28"/>
-            <p:cNvSpPr txBox="1"/>
-            <p:nvPr/>
-          </p:nvSpPr>
-          <p:spPr>
-            <a:xfrm>
-              <a:off x="9399835" y="5802108"/>
-              <a:ext cx="3849391" cy="843522"/>
-            </a:xfrm>
-            <a:prstGeom prst="rect">
-              <a:avLst/>
-            </a:prstGeom>
-            <a:noFill/>
-          </p:spPr>
-          <p:txBody>
-            <a:bodyPr wrap="none" rtlCol="0">
-              <a:spAutoFit/>
-            </a:bodyPr>
-            <a:lstStyle/>
-            <a:p>
-              <a:r>
-                <a:rPr lang="en-IN" dirty="0" smtClean="0">
-                  <a:latin typeface="Times New Roman" panose="02020603050405020304" pitchFamily="18" charset="0"/>
-                  <a:cs typeface="Times New Roman" panose="02020603050405020304" pitchFamily="18" charset="0"/>
-                </a:rPr>
-                <a:t>(Mimics the input of RC </a:t>
-              </a:r>
-            </a:p>
-            <a:p>
-              <a:r>
-                <a:rPr lang="en-IN" dirty="0" smtClean="0">
-                  <a:latin typeface="Times New Roman" panose="02020603050405020304" pitchFamily="18" charset="0"/>
-                  <a:cs typeface="Times New Roman" panose="02020603050405020304" pitchFamily="18" charset="0"/>
-                </a:rPr>
-                <a:t>Controller)</a:t>
-              </a:r>
-              <a:endParaRPr lang="en-IN" dirty="0">
-                <a:latin typeface="Times New Roman" panose="02020603050405020304" pitchFamily="18" charset="0"/>
-                <a:cs typeface="Times New Roman" panose="02020603050405020304" pitchFamily="18" charset="0"/>
-              </a:endParaRPr>
-            </a:p>
-          </p:txBody>
-        </p:sp>
-      </p:grpSp>
       <p:sp>
         <p:nvSpPr>
           <p:cNvPr id="30" name="TextBox 29"/>
@@ -17046,6 +15870,66 @@
           </a:p>
         </p:txBody>
       </p:sp>
+      <p:sp>
+        <p:nvSpPr>
+          <p:cNvPr id="31" name="TextBox 30"/>
+          <p:cNvSpPr txBox="1"/>
+          <p:nvPr/>
+        </p:nvSpPr>
+        <p:spPr>
+          <a:xfrm>
+            <a:off x="1940511" y="6179134"/>
+            <a:ext cx="5262979" cy="369332"/>
+          </a:xfrm>
+          <a:prstGeom prst="rect">
+            <a:avLst/>
+          </a:prstGeom>
+          <a:noFill/>
+        </p:spPr>
+        <p:txBody>
+          <a:bodyPr wrap="none" rtlCol="0">
+            <a:spAutoFit/>
+          </a:bodyPr>
+          <a:lstStyle/>
+          <a:p>
+            <a:r>
+              <a:rPr lang="en-IN" dirty="0" smtClean="0">
+                <a:latin typeface="Arial" panose="020B0604020202020204" pitchFamily="34" charset="0"/>
+                <a:cs typeface="Arial" panose="020B0604020202020204" pitchFamily="34" charset="0"/>
+              </a:rPr>
+              <a:t>Fig 1. Overall Block Diagram of Proposed System</a:t>
+            </a:r>
+            <a:endParaRPr lang="en-IN" dirty="0">
+              <a:latin typeface="Arial" panose="020B0604020202020204" pitchFamily="34" charset="0"/>
+              <a:cs typeface="Arial" panose="020B0604020202020204" pitchFamily="34" charset="0"/>
+            </a:endParaRPr>
+          </a:p>
+        </p:txBody>
+      </p:sp>
+      <p:pic>
+        <p:nvPicPr>
+          <p:cNvPr id="59" name="Picture 58"/>
+          <p:cNvPicPr>
+            <a:picLocks noChangeAspect="1"/>
+          </p:cNvPicPr>
+          <p:nvPr/>
+        </p:nvPicPr>
+        <p:blipFill>
+          <a:blip r:embed="rId2"/>
+          <a:stretch>
+            <a:fillRect/>
+          </a:stretch>
+        </p:blipFill>
+        <p:spPr>
+          <a:xfrm>
+            <a:off x="122289" y="954373"/>
+            <a:ext cx="8899422" cy="5069118"/>
+          </a:xfrm>
+          <a:prstGeom prst="rect">
+            <a:avLst/>
+          </a:prstGeom>
+        </p:spPr>
+      </p:pic>
     </p:spTree>
   </p:cSld>
   <p:clrMapOvr>
@@ -17086,7 +15970,7 @@
           <a:bodyPr/>
           <a:lstStyle/>
           <a:p>
-            <a:pPr>
+            <a:pPr algn="just">
               <a:buFont typeface="Arial" pitchFamily="34" charset="0"/>
               <a:buChar char="•"/>
             </a:pPr>
@@ -17182,7 +16066,7 @@
     </p:spTree>
     <p:extLst>
       <p:ext uri="{BB962C8B-B14F-4D97-AF65-F5344CB8AC3E}">
-        <p14:creationId xmlns:p14="http://schemas.microsoft.com/office/powerpoint/2010/main" xmlns="" val="2577636752"/>
+        <p14:creationId xmlns:p14="http://schemas.microsoft.com/office/powerpoint/2010/main" val="2577636752"/>
       </p:ext>
     </p:extLst>
   </p:cSld>
@@ -17231,43 +16115,105 @@
           </a:bodyPr>
           <a:lstStyle/>
           <a:p>
-            <a:pPr>
+            <a:pPr algn="just">
               <a:buFont typeface="Arial" pitchFamily="34" charset="0"/>
               <a:buChar char="•"/>
             </a:pPr>
             <a:r>
               <a:rPr lang="en-IN" sz="2800" dirty="0" smtClean="0"/>
-              <a:t>The communication sub-system is aimed at providing communication between the drone and the user</a:t>
-            </a:r>
-          </a:p>
-          <a:p>
-            <a:pPr>
+              <a:t>Communication </a:t>
+            </a:r>
+            <a:r>
+              <a:rPr lang="en-IN" sz="2800" dirty="0" smtClean="0"/>
+              <a:t>sub-system </a:t>
+            </a:r>
+            <a:r>
+              <a:rPr lang="en-IN" sz="2800" dirty="0" smtClean="0"/>
+              <a:t>aimed </a:t>
+            </a:r>
+            <a:r>
+              <a:rPr lang="en-IN" sz="2800" dirty="0" smtClean="0"/>
+              <a:t>at providing communication between the drone and the user</a:t>
+            </a:r>
+          </a:p>
+          <a:p>
+            <a:pPr algn="just">
               <a:buFont typeface="Arial" pitchFamily="34" charset="0"/>
               <a:buChar char="•"/>
             </a:pPr>
             <a:r>
               <a:rPr lang="en-IN" sz="2800" dirty="0" smtClean="0"/>
-              <a:t>The autonomous driving subsystem contains two input sensors, a GPS receiver and an IMU unit.</a:t>
-            </a:r>
-          </a:p>
-          <a:p>
-            <a:pPr>
+              <a:t>Autonomous </a:t>
+            </a:r>
+            <a:r>
+              <a:rPr lang="en-IN" sz="2800" dirty="0" smtClean="0"/>
+              <a:t>driving subsystem contains two input sensors, a GPS receiver and an IMU unit.</a:t>
+            </a:r>
+          </a:p>
+          <a:p>
+            <a:pPr algn="just">
               <a:buFont typeface="Arial" pitchFamily="34" charset="0"/>
               <a:buChar char="•"/>
             </a:pPr>
             <a:r>
               <a:rPr lang="en-IN" sz="2800" dirty="0" smtClean="0"/>
-              <a:t>The obstacle avoidance sub-</a:t>
-            </a:r>
-            <a:r>
-              <a:rPr lang="en-IN" sz="2800" dirty="0" err="1" smtClean="0"/>
-              <a:t>sytems</a:t>
+              <a:t>Obstacle </a:t>
             </a:r>
             <a:r>
               <a:rPr lang="en-IN" sz="2800" dirty="0" smtClean="0"/>
-              <a:t> constantly looks for any obstacles it gets in its way and alerts the Main controller if any obstacle is there and the Main controller takes actions based on the direction and closeness of the obstacle.</a:t>
+              <a:t>avoidance </a:t>
+            </a:r>
+            <a:r>
+              <a:rPr lang="en-IN" sz="2800" dirty="0" smtClean="0"/>
+              <a:t>sub-systems </a:t>
+            </a:r>
+            <a:r>
+              <a:rPr lang="en-IN" sz="2800" dirty="0" smtClean="0"/>
+              <a:t>constantly looks for any obstacles it gets in its </a:t>
+            </a:r>
+            <a:r>
+              <a:rPr lang="en-IN" sz="2800" dirty="0" smtClean="0"/>
+              <a:t>way.</a:t>
+            </a:r>
+          </a:p>
+          <a:p>
+            <a:pPr algn="just">
+              <a:buFont typeface="Arial" pitchFamily="34" charset="0"/>
+              <a:buChar char="•"/>
+            </a:pPr>
+            <a:r>
+              <a:rPr lang="en-IN" sz="2800" dirty="0" smtClean="0"/>
+              <a:t>All the above data is collected by the Main Controller through a Communication Bus and corresponding action is taken by the Main Controller</a:t>
             </a:r>
             <a:endParaRPr lang="en-US" sz="2800" dirty="0"/>
+          </a:p>
+        </p:txBody>
+      </p:sp>
+      <p:sp>
+        <p:nvSpPr>
+          <p:cNvPr id="3" name="Content Placeholder 2"/>
+          <p:cNvSpPr>
+            <a:spLocks noGrp="1"/>
+          </p:cNvSpPr>
+          <p:nvPr>
+            <p:ph sz="quarter" idx="10"/>
+          </p:nvPr>
+        </p:nvSpPr>
+        <p:spPr>
+          <a:xfrm>
+            <a:off x="304800" y="0"/>
+            <a:ext cx="6324600" cy="1143000"/>
+          </a:xfrm>
+        </p:spPr>
+        <p:txBody>
+          <a:bodyPr/>
+          <a:lstStyle/>
+          <a:p>
+            <a:r>
+              <a:rPr lang="en-IN" dirty="0" smtClean="0"/>
+              <a:t>Architecture Overview</a:t>
+            </a:r>
+            <a:endParaRPr lang="en-IN" dirty="0"/>
           </a:p>
         </p:txBody>
       </p:sp>

</xml_diff>

<commit_message>
Presentation - Extensive Info added
</commit_message>
<xml_diff>
--- a/esd final.pptx
+++ b/esd final.pptx
@@ -24,9 +24,16 @@
     <p:sldId id="286" r:id="rId18"/>
     <p:sldId id="297" r:id="rId19"/>
     <p:sldId id="292" r:id="rId20"/>
-    <p:sldId id="293" r:id="rId21"/>
-    <p:sldId id="294" r:id="rId22"/>
-    <p:sldId id="295" r:id="rId23"/>
+    <p:sldId id="298" r:id="rId21"/>
+    <p:sldId id="304" r:id="rId22"/>
+    <p:sldId id="293" r:id="rId23"/>
+    <p:sldId id="299" r:id="rId24"/>
+    <p:sldId id="294" r:id="rId25"/>
+    <p:sldId id="300" r:id="rId26"/>
+    <p:sldId id="301" r:id="rId27"/>
+    <p:sldId id="302" r:id="rId28"/>
+    <p:sldId id="303" r:id="rId29"/>
+    <p:sldId id="295" r:id="rId30"/>
   </p:sldIdLst>
   <p:sldSz cx="9144000" cy="6858000" type="screen4x3"/>
   <p:notesSz cx="6858000" cy="9144000"/>
@@ -10369,13 +10376,8 @@
           <a:p>
             <a:r>
               <a:rPr lang="en-US" dirty="0" smtClean="0"/>
-              <a:t>Jeevaraam </a:t>
-            </a:r>
-            <a:r>
-              <a:rPr lang="en-US" dirty="0" smtClean="0"/>
-              <a:t>K (2020H1400216H)</a:t>
-            </a:r>
-            <a:endParaRPr lang="en-US" dirty="0" smtClean="0"/>
+              <a:t>Jeevaraam K (2020H1400216H)</a:t>
+            </a:r>
           </a:p>
           <a:p>
             <a:r>
@@ -10385,6 +10387,10 @@
             <a:r>
               <a:rPr lang="en-US" dirty="0" err="1" smtClean="0"/>
               <a:t>Phaye</a:t>
+            </a:r>
+            <a:r>
+              <a:rPr lang="en-US" dirty="0" smtClean="0"/>
+              <a:t> (2020H1400230H)</a:t>
             </a:r>
             <a:endParaRPr lang="en-US" dirty="0" smtClean="0"/>
           </a:p>
@@ -14901,27 +14907,134 @@
       </p:grpSpPr>
       <p:sp>
         <p:nvSpPr>
-          <p:cNvPr id="2" name="Content Placeholder 1"/>
+          <p:cNvPr id="3" name="Content Placeholder 2"/>
           <p:cNvSpPr>
             <a:spLocks noGrp="1"/>
           </p:cNvSpPr>
           <p:nvPr>
-            <p:ph idx="1"/>
+            <p:ph sz="quarter" idx="10"/>
           </p:nvPr>
         </p:nvSpPr>
-        <p:spPr/>
+        <p:spPr>
+          <a:xfrm>
+            <a:off x="304800" y="-17206"/>
+            <a:ext cx="6324600" cy="1143000"/>
+          </a:xfrm>
+        </p:spPr>
         <p:txBody>
           <a:bodyPr/>
           <a:lstStyle/>
           <a:p>
             <a:r>
               <a:rPr lang="en-IN" dirty="0" smtClean="0"/>
-              <a:t>Points complementing the data given in Aim and Objectives slide</a:t>
+              <a:t>Results and Output</a:t>
             </a:r>
             <a:endParaRPr lang="en-IN" dirty="0"/>
           </a:p>
         </p:txBody>
       </p:sp>
+      <p:pic>
+        <p:nvPicPr>
+          <p:cNvPr id="5" name="Content Placeholder 4"/>
+          <p:cNvPicPr>
+            <a:picLocks noGrp="1" noChangeAspect="1"/>
+          </p:cNvPicPr>
+          <p:nvPr>
+            <p:ph idx="1"/>
+          </p:nvPr>
+        </p:nvPicPr>
+        <p:blipFill>
+          <a:blip r:embed="rId2" cstate="print">
+            <a:extLst>
+              <a:ext uri="{28A0092B-C50C-407E-A947-70E740481C1C}">
+                <a14:useLocalDpi xmlns:a14="http://schemas.microsoft.com/office/drawing/2010/main" val="0"/>
+              </a:ext>
+            </a:extLst>
+          </a:blip>
+          <a:stretch>
+            <a:fillRect/>
+          </a:stretch>
+        </p:blipFill>
+        <p:spPr>
+          <a:xfrm rot="16200000">
+            <a:off x="2580383" y="707727"/>
+            <a:ext cx="3983234" cy="5310980"/>
+          </a:xfrm>
+        </p:spPr>
+      </p:pic>
+      <p:sp>
+        <p:nvSpPr>
+          <p:cNvPr id="7" name="TextBox 6"/>
+          <p:cNvSpPr txBox="1"/>
+          <p:nvPr/>
+        </p:nvSpPr>
+        <p:spPr>
+          <a:xfrm>
+            <a:off x="1081269" y="5612931"/>
+            <a:ext cx="6981463" cy="369332"/>
+          </a:xfrm>
+          <a:prstGeom prst="rect">
+            <a:avLst/>
+          </a:prstGeom>
+          <a:noFill/>
+        </p:spPr>
+        <p:txBody>
+          <a:bodyPr wrap="none" rtlCol="0">
+            <a:spAutoFit/>
+          </a:bodyPr>
+          <a:lstStyle/>
+          <a:p>
+            <a:r>
+              <a:rPr lang="en-IN" dirty="0" smtClean="0">
+                <a:latin typeface="Arial" panose="020B0604020202020204" pitchFamily="34" charset="0"/>
+                <a:cs typeface="Arial" panose="020B0604020202020204" pitchFamily="34" charset="0"/>
+              </a:rPr>
+              <a:t>Fig </a:t>
+            </a:r>
+            <a:r>
+              <a:rPr lang="en-IN" dirty="0" smtClean="0">
+                <a:latin typeface="Arial" panose="020B0604020202020204" pitchFamily="34" charset="0"/>
+                <a:cs typeface="Arial" panose="020B0604020202020204" pitchFamily="34" charset="0"/>
+              </a:rPr>
+              <a:t>3. Verification of I2C Communication between two Subsystems</a:t>
+            </a:r>
+            <a:endParaRPr lang="en-IN" dirty="0">
+              <a:latin typeface="Arial" panose="020B0604020202020204" pitchFamily="34" charset="0"/>
+              <a:cs typeface="Arial" panose="020B0604020202020204" pitchFamily="34" charset="0"/>
+            </a:endParaRPr>
+          </a:p>
+        </p:txBody>
+      </p:sp>
+    </p:spTree>
+    <p:extLst>
+      <p:ext uri="{BB962C8B-B14F-4D97-AF65-F5344CB8AC3E}">
+        <p14:creationId xmlns:p14="http://schemas.microsoft.com/office/powerpoint/2010/main" val="1369725211"/>
+      </p:ext>
+    </p:extLst>
+  </p:cSld>
+  <p:clrMapOvr>
+    <a:masterClrMapping/>
+  </p:clrMapOvr>
+</p:sld>
+</file>
+
+<file path=ppt/slides/slide21.xml><?xml version="1.0" encoding="utf-8"?>
+<p:sld xmlns:a="http://schemas.openxmlformats.org/drawingml/2006/main" xmlns:r="http://schemas.openxmlformats.org/officeDocument/2006/relationships" xmlns:p="http://schemas.openxmlformats.org/presentationml/2006/main">
+  <p:cSld>
+    <p:spTree>
+      <p:nvGrpSpPr>
+        <p:cNvPr id="1" name=""/>
+        <p:cNvGrpSpPr/>
+        <p:nvPr/>
+      </p:nvGrpSpPr>
+      <p:grpSpPr>
+        <a:xfrm>
+          <a:off x="0" y="0"/>
+          <a:ext cx="0" cy="0"/>
+          <a:chOff x="0" y="0"/>
+          <a:chExt cx="0" cy="0"/>
+        </a:xfrm>
+      </p:grpSpPr>
       <p:sp>
         <p:nvSpPr>
           <p:cNvPr id="3" name="Content Placeholder 2"/>
@@ -14934,7 +15047,7 @@
         </p:nvSpPr>
         <p:spPr>
           <a:xfrm>
-            <a:off x="304800" y="0"/>
+            <a:off x="304800" y="-17206"/>
             <a:ext cx="6324600" cy="1143000"/>
           </a:xfrm>
         </p:spPr>
@@ -14944,16 +15057,95 @@
           <a:p>
             <a:r>
               <a:rPr lang="en-IN" dirty="0" smtClean="0"/>
-              <a:t>Conclusion</a:t>
+              <a:t>Results and Output</a:t>
             </a:r>
             <a:endParaRPr lang="en-IN" dirty="0"/>
+          </a:p>
+        </p:txBody>
+      </p:sp>
+      <p:pic>
+        <p:nvPicPr>
+          <p:cNvPr id="5" name="Content Placeholder 4"/>
+          <p:cNvPicPr>
+            <a:picLocks noGrp="1" noChangeAspect="1"/>
+          </p:cNvPicPr>
+          <p:nvPr>
+            <p:ph idx="1"/>
+          </p:nvPr>
+        </p:nvPicPr>
+        <p:blipFill>
+          <a:blip r:embed="rId2">
+            <a:extLst>
+              <a:ext uri="{28A0092B-C50C-407E-A947-70E740481C1C}">
+                <a14:useLocalDpi xmlns:a14="http://schemas.microsoft.com/office/drawing/2010/main" val="0"/>
+              </a:ext>
+            </a:extLst>
+          </a:blip>
+          <a:stretch>
+            <a:fillRect/>
+          </a:stretch>
+        </p:blipFill>
+        <p:spPr>
+          <a:xfrm>
+            <a:off x="304800" y="953504"/>
+            <a:ext cx="8534400" cy="4819425"/>
+          </a:xfrm>
+        </p:spPr>
+      </p:pic>
+      <p:sp>
+        <p:nvSpPr>
+          <p:cNvPr id="7" name="TextBox 6"/>
+          <p:cNvSpPr txBox="1"/>
+          <p:nvPr/>
+        </p:nvSpPr>
+        <p:spPr>
+          <a:xfrm>
+            <a:off x="1491669" y="5780303"/>
+            <a:ext cx="6160661" cy="369332"/>
+          </a:xfrm>
+          <a:prstGeom prst="rect">
+            <a:avLst/>
+          </a:prstGeom>
+          <a:noFill/>
+        </p:spPr>
+        <p:txBody>
+          <a:bodyPr wrap="none" rtlCol="0">
+            <a:spAutoFit/>
+          </a:bodyPr>
+          <a:lstStyle/>
+          <a:p>
+            <a:r>
+              <a:rPr lang="en-IN" dirty="0" smtClean="0">
+                <a:latin typeface="Arial" panose="020B0604020202020204" pitchFamily="34" charset="0"/>
+                <a:cs typeface="Arial" panose="020B0604020202020204" pitchFamily="34" charset="0"/>
+              </a:rPr>
+              <a:t>Fig </a:t>
+            </a:r>
+            <a:r>
+              <a:rPr lang="en-IN" dirty="0">
+                <a:latin typeface="Arial" panose="020B0604020202020204" pitchFamily="34" charset="0"/>
+                <a:cs typeface="Arial" panose="020B0604020202020204" pitchFamily="34" charset="0"/>
+              </a:rPr>
+              <a:t>4</a:t>
+            </a:r>
+            <a:r>
+              <a:rPr lang="en-IN" dirty="0" smtClean="0">
+                <a:latin typeface="Arial" panose="020B0604020202020204" pitchFamily="34" charset="0"/>
+                <a:cs typeface="Arial" panose="020B0604020202020204" pitchFamily="34" charset="0"/>
+              </a:rPr>
+              <a:t>. MSP432 Debug Print of I2C Data Collection Routine</a:t>
+            </a:r>
+            <a:endParaRPr lang="en-IN" dirty="0">
+              <a:latin typeface="Arial" panose="020B0604020202020204" pitchFamily="34" charset="0"/>
+              <a:cs typeface="Arial" panose="020B0604020202020204" pitchFamily="34" charset="0"/>
+            </a:endParaRPr>
           </a:p>
         </p:txBody>
       </p:sp>
     </p:spTree>
     <p:extLst>
       <p:ext uri="{BB962C8B-B14F-4D97-AF65-F5344CB8AC3E}">
-        <p14:creationId xmlns:p14="http://schemas.microsoft.com/office/powerpoint/2010/main" val="1784680704"/>
+        <p14:creationId xmlns:p14="http://schemas.microsoft.com/office/powerpoint/2010/main" val="2546016564"/>
       </p:ext>
     </p:extLst>
   </p:cSld>
@@ -14963,7 +15155,7 @@
 </p:sld>
 </file>
 
-<file path=ppt/slides/slide21.xml><?xml version="1.0" encoding="utf-8"?>
+<file path=ppt/slides/slide22.xml><?xml version="1.0" encoding="utf-8"?>
 <p:sld xmlns:a="http://schemas.openxmlformats.org/drawingml/2006/main" xmlns:r="http://schemas.openxmlformats.org/officeDocument/2006/relationships" xmlns:p="http://schemas.openxmlformats.org/presentationml/2006/main">
   <p:cSld>
     <p:spTree>
@@ -15000,6 +15192,208 @@
               <a:buChar char="•"/>
             </a:pPr>
             <a:r>
+              <a:rPr lang="en-IN" dirty="0" smtClean="0"/>
+              <a:t>The basic architecture for Autonomous Drone was designed and certain parts are kept as open ended to allow modifications and upgradations in future</a:t>
+            </a:r>
+          </a:p>
+          <a:p>
+            <a:pPr algn="just">
+              <a:buFont typeface="Arial" panose="020B0604020202020204" pitchFamily="34" charset="0"/>
+              <a:buChar char="•"/>
+            </a:pPr>
+            <a:r>
+              <a:rPr lang="en-IN" dirty="0" smtClean="0"/>
+              <a:t>The Code for Absolute Position Subsystem was created using Arduino and GPS </a:t>
+            </a:r>
+          </a:p>
+          <a:p>
+            <a:pPr algn="just">
+              <a:buFont typeface="Arial" panose="020B0604020202020204" pitchFamily="34" charset="0"/>
+              <a:buChar char="•"/>
+            </a:pPr>
+            <a:r>
+              <a:rPr lang="en-IN" dirty="0" smtClean="0"/>
+              <a:t>The Code for Main Controller was created </a:t>
+            </a:r>
+            <a:r>
+              <a:rPr lang="en-IN" dirty="0" smtClean="0"/>
+              <a:t>with target microcontroller as MSP432</a:t>
+            </a:r>
+          </a:p>
+        </p:txBody>
+      </p:sp>
+      <p:sp>
+        <p:nvSpPr>
+          <p:cNvPr id="3" name="Content Placeholder 2"/>
+          <p:cNvSpPr>
+            <a:spLocks noGrp="1"/>
+          </p:cNvSpPr>
+          <p:nvPr>
+            <p:ph sz="quarter" idx="10"/>
+          </p:nvPr>
+        </p:nvSpPr>
+        <p:spPr>
+          <a:xfrm>
+            <a:off x="304800" y="0"/>
+            <a:ext cx="6324600" cy="1143000"/>
+          </a:xfrm>
+        </p:spPr>
+        <p:txBody>
+          <a:bodyPr/>
+          <a:lstStyle/>
+          <a:p>
+            <a:r>
+              <a:rPr lang="en-IN" dirty="0" smtClean="0"/>
+              <a:t>Conclusion</a:t>
+            </a:r>
+            <a:endParaRPr lang="en-IN" dirty="0"/>
+          </a:p>
+        </p:txBody>
+      </p:sp>
+    </p:spTree>
+    <p:extLst>
+      <p:ext uri="{BB962C8B-B14F-4D97-AF65-F5344CB8AC3E}">
+        <p14:creationId xmlns:p14="http://schemas.microsoft.com/office/powerpoint/2010/main" val="1784680704"/>
+      </p:ext>
+    </p:extLst>
+  </p:cSld>
+  <p:clrMapOvr>
+    <a:masterClrMapping/>
+  </p:clrMapOvr>
+</p:sld>
+</file>
+
+<file path=ppt/slides/slide23.xml><?xml version="1.0" encoding="utf-8"?>
+<p:sld xmlns:a="http://schemas.openxmlformats.org/drawingml/2006/main" xmlns:r="http://schemas.openxmlformats.org/officeDocument/2006/relationships" xmlns:p="http://schemas.openxmlformats.org/presentationml/2006/main">
+  <p:cSld>
+    <p:spTree>
+      <p:nvGrpSpPr>
+        <p:cNvPr id="1" name=""/>
+        <p:cNvGrpSpPr/>
+        <p:nvPr/>
+      </p:nvGrpSpPr>
+      <p:grpSpPr>
+        <a:xfrm>
+          <a:off x="0" y="0"/>
+          <a:ext cx="0" cy="0"/>
+          <a:chOff x="0" y="0"/>
+          <a:chExt cx="0" cy="0"/>
+        </a:xfrm>
+      </p:grpSpPr>
+      <p:sp>
+        <p:nvSpPr>
+          <p:cNvPr id="2" name="Content Placeholder 1"/>
+          <p:cNvSpPr>
+            <a:spLocks noGrp="1"/>
+          </p:cNvSpPr>
+          <p:nvPr>
+            <p:ph idx="1"/>
+          </p:nvPr>
+        </p:nvSpPr>
+        <p:spPr/>
+        <p:txBody>
+          <a:bodyPr/>
+          <a:lstStyle/>
+          <a:p>
+            <a:pPr algn="just">
+              <a:buFont typeface="Arial" panose="020B0604020202020204" pitchFamily="34" charset="0"/>
+              <a:buChar char="•"/>
+            </a:pPr>
+            <a:r>
+              <a:rPr lang="en-IN" dirty="0" smtClean="0"/>
+              <a:t>The GPS interface with Microcontroller was not completed due to non-availability of GPS module</a:t>
+            </a:r>
+          </a:p>
+          <a:p>
+            <a:pPr algn="just">
+              <a:buFont typeface="Arial" panose="020B0604020202020204" pitchFamily="34" charset="0"/>
+              <a:buChar char="•"/>
+            </a:pPr>
+            <a:r>
+              <a:rPr lang="en-IN" dirty="0" smtClean="0"/>
+              <a:t>The Relative Position Subsystem was not interfaced with BNO055 due to hardware non-availability</a:t>
+            </a:r>
+          </a:p>
+        </p:txBody>
+      </p:sp>
+      <p:sp>
+        <p:nvSpPr>
+          <p:cNvPr id="3" name="Content Placeholder 2"/>
+          <p:cNvSpPr>
+            <a:spLocks noGrp="1"/>
+          </p:cNvSpPr>
+          <p:nvPr>
+            <p:ph sz="quarter" idx="10"/>
+          </p:nvPr>
+        </p:nvSpPr>
+        <p:spPr>
+          <a:xfrm>
+            <a:off x="304800" y="0"/>
+            <a:ext cx="6324600" cy="1143000"/>
+          </a:xfrm>
+        </p:spPr>
+        <p:txBody>
+          <a:bodyPr/>
+          <a:lstStyle/>
+          <a:p>
+            <a:r>
+              <a:rPr lang="en-IN" dirty="0" smtClean="0"/>
+              <a:t>Pending Works</a:t>
+            </a:r>
+            <a:endParaRPr lang="en-IN" dirty="0"/>
+          </a:p>
+        </p:txBody>
+      </p:sp>
+    </p:spTree>
+    <p:extLst>
+      <p:ext uri="{BB962C8B-B14F-4D97-AF65-F5344CB8AC3E}">
+        <p14:creationId xmlns:p14="http://schemas.microsoft.com/office/powerpoint/2010/main" val="3249009592"/>
+      </p:ext>
+    </p:extLst>
+  </p:cSld>
+  <p:clrMapOvr>
+    <a:masterClrMapping/>
+  </p:clrMapOvr>
+</p:sld>
+</file>
+
+<file path=ppt/slides/slide24.xml><?xml version="1.0" encoding="utf-8"?>
+<p:sld xmlns:a="http://schemas.openxmlformats.org/drawingml/2006/main" xmlns:r="http://schemas.openxmlformats.org/officeDocument/2006/relationships" xmlns:p="http://schemas.openxmlformats.org/presentationml/2006/main">
+  <p:cSld>
+    <p:spTree>
+      <p:nvGrpSpPr>
+        <p:cNvPr id="1" name=""/>
+        <p:cNvGrpSpPr/>
+        <p:nvPr/>
+      </p:nvGrpSpPr>
+      <p:grpSpPr>
+        <a:xfrm>
+          <a:off x="0" y="0"/>
+          <a:ext cx="0" cy="0"/>
+          <a:chOff x="0" y="0"/>
+          <a:chExt cx="0" cy="0"/>
+        </a:xfrm>
+      </p:grpSpPr>
+      <p:sp>
+        <p:nvSpPr>
+          <p:cNvPr id="2" name="Content Placeholder 1"/>
+          <p:cNvSpPr>
+            <a:spLocks noGrp="1"/>
+          </p:cNvSpPr>
+          <p:nvPr>
+            <p:ph idx="1"/>
+          </p:nvPr>
+        </p:nvSpPr>
+        <p:spPr/>
+        <p:txBody>
+          <a:bodyPr/>
+          <a:lstStyle/>
+          <a:p>
+            <a:pPr algn="just">
+              <a:buFont typeface="Arial" panose="020B0604020202020204" pitchFamily="34" charset="0"/>
+              <a:buChar char="•"/>
+            </a:pPr>
+            <a:r>
               <a:rPr lang="en-US" dirty="0"/>
               <a:t>In this architecture, additional features can also be added since the communication bus is I2C and the master controller can be configured after adding the additional subsystems to the bus and integrated with the system easily</a:t>
             </a:r>
@@ -15069,7 +15463,562 @@
 </p:sld>
 </file>
 
-<file path=ppt/slides/slide22.xml><?xml version="1.0" encoding="utf-8"?>
+<file path=ppt/slides/slide25.xml><?xml version="1.0" encoding="utf-8"?>
+<p:sld xmlns:a="http://schemas.openxmlformats.org/drawingml/2006/main" xmlns:r="http://schemas.openxmlformats.org/officeDocument/2006/relationships" xmlns:p="http://schemas.openxmlformats.org/presentationml/2006/main">
+  <p:cSld>
+    <p:spTree>
+      <p:nvGrpSpPr>
+        <p:cNvPr id="1" name=""/>
+        <p:cNvGrpSpPr/>
+        <p:nvPr/>
+      </p:nvGrpSpPr>
+      <p:grpSpPr>
+        <a:xfrm>
+          <a:off x="0" y="0"/>
+          <a:ext cx="0" cy="0"/>
+          <a:chOff x="0" y="0"/>
+          <a:chExt cx="0" cy="0"/>
+        </a:xfrm>
+      </p:grpSpPr>
+      <p:sp>
+        <p:nvSpPr>
+          <p:cNvPr id="2" name="Content Placeholder 1"/>
+          <p:cNvSpPr>
+            <a:spLocks noGrp="1"/>
+          </p:cNvSpPr>
+          <p:nvPr>
+            <p:ph sz="quarter" idx="10"/>
+          </p:nvPr>
+        </p:nvSpPr>
+        <p:spPr/>
+        <p:txBody>
+          <a:bodyPr/>
+          <a:lstStyle/>
+          <a:p>
+            <a:pPr algn="ctr"/>
+            <a:r>
+              <a:rPr lang="en-IN" dirty="0" smtClean="0"/>
+              <a:t>EXTENSIVE INFORMATION</a:t>
+            </a:r>
+            <a:endParaRPr lang="en-IN" dirty="0"/>
+          </a:p>
+        </p:txBody>
+      </p:sp>
+    </p:spTree>
+    <p:extLst>
+      <p:ext uri="{BB962C8B-B14F-4D97-AF65-F5344CB8AC3E}">
+        <p14:creationId xmlns:p14="http://schemas.microsoft.com/office/powerpoint/2010/main" val="1271310058"/>
+      </p:ext>
+    </p:extLst>
+  </p:cSld>
+  <p:clrMapOvr>
+    <a:masterClrMapping/>
+  </p:clrMapOvr>
+</p:sld>
+</file>
+
+<file path=ppt/slides/slide26.xml><?xml version="1.0" encoding="utf-8"?>
+<p:sld xmlns:a="http://schemas.openxmlformats.org/drawingml/2006/main" xmlns:r="http://schemas.openxmlformats.org/officeDocument/2006/relationships" xmlns:p="http://schemas.openxmlformats.org/presentationml/2006/main">
+  <p:cSld>
+    <p:spTree>
+      <p:nvGrpSpPr>
+        <p:cNvPr id="1" name=""/>
+        <p:cNvGrpSpPr/>
+        <p:nvPr/>
+      </p:nvGrpSpPr>
+      <p:grpSpPr>
+        <a:xfrm>
+          <a:off x="0" y="0"/>
+          <a:ext cx="0" cy="0"/>
+          <a:chOff x="0" y="0"/>
+          <a:chExt cx="0" cy="0"/>
+        </a:xfrm>
+      </p:grpSpPr>
+      <p:sp>
+        <p:nvSpPr>
+          <p:cNvPr id="2" name="Content Placeholder 1"/>
+          <p:cNvSpPr>
+            <a:spLocks noGrp="1"/>
+          </p:cNvSpPr>
+          <p:nvPr>
+            <p:ph idx="1"/>
+          </p:nvPr>
+        </p:nvSpPr>
+        <p:spPr>
+          <a:xfrm>
+            <a:off x="304800" y="1140542"/>
+            <a:ext cx="8458200" cy="5031657"/>
+          </a:xfrm>
+        </p:spPr>
+        <p:txBody>
+          <a:bodyPr>
+            <a:normAutofit fontScale="92500" lnSpcReduction="10000"/>
+          </a:bodyPr>
+          <a:lstStyle/>
+          <a:p>
+            <a:pPr algn="just">
+              <a:buFont typeface="Arial" panose="020B0604020202020204" pitchFamily="34" charset="0"/>
+              <a:buChar char="•"/>
+            </a:pPr>
+            <a:r>
+              <a:rPr lang="en-IN" dirty="0" smtClean="0"/>
+              <a:t>Model : MSP432P401R</a:t>
+            </a:r>
+          </a:p>
+          <a:p>
+            <a:pPr algn="just">
+              <a:buFont typeface="Arial" panose="020B0604020202020204" pitchFamily="34" charset="0"/>
+              <a:buChar char="•"/>
+            </a:pPr>
+            <a:r>
+              <a:rPr lang="en-IN" dirty="0" smtClean="0"/>
+              <a:t>Programming Platform : Code Composer Studio 10 (Linux)</a:t>
+            </a:r>
+          </a:p>
+          <a:p>
+            <a:pPr algn="just">
+              <a:buFont typeface="Arial" panose="020B0604020202020204" pitchFamily="34" charset="0"/>
+              <a:buChar char="•"/>
+            </a:pPr>
+            <a:r>
+              <a:rPr lang="en-IN" dirty="0" smtClean="0"/>
+              <a:t>Clock Configuration</a:t>
+            </a:r>
+          </a:p>
+          <a:p>
+            <a:pPr marL="633413" algn="just">
+              <a:buFont typeface="Wingdings" panose="05000000000000000000" pitchFamily="2" charset="2"/>
+              <a:buChar char="v"/>
+            </a:pPr>
+            <a:r>
+              <a:rPr lang="en-IN" dirty="0" smtClean="0"/>
+              <a:t>SMCLK : 3 MHz</a:t>
+            </a:r>
+          </a:p>
+          <a:p>
+            <a:pPr marL="633413" algn="just">
+              <a:buFont typeface="Wingdings" panose="05000000000000000000" pitchFamily="2" charset="2"/>
+              <a:buChar char="v"/>
+            </a:pPr>
+            <a:r>
+              <a:rPr lang="en-IN" dirty="0" smtClean="0"/>
+              <a:t>Core Clock : 48 MHz</a:t>
+            </a:r>
+          </a:p>
+          <a:p>
+            <a:pPr marL="633413" algn="just">
+              <a:buFont typeface="Wingdings" panose="05000000000000000000" pitchFamily="2" charset="2"/>
+              <a:buChar char="v"/>
+            </a:pPr>
+            <a:r>
+              <a:rPr lang="en-IN" dirty="0" smtClean="0"/>
+              <a:t>UART Speed : 115200 bps</a:t>
+            </a:r>
+          </a:p>
+          <a:p>
+            <a:pPr marL="633413" algn="just">
+              <a:buFont typeface="Wingdings" panose="05000000000000000000" pitchFamily="2" charset="2"/>
+              <a:buChar char="v"/>
+            </a:pPr>
+            <a:r>
+              <a:rPr lang="en-IN" dirty="0" smtClean="0"/>
+              <a:t>I2C Speed : 430 kHz</a:t>
+            </a:r>
+          </a:p>
+          <a:p>
+            <a:pPr algn="just">
+              <a:buFont typeface="Arial" panose="020B0604020202020204" pitchFamily="34" charset="0"/>
+              <a:buChar char="•"/>
+            </a:pPr>
+            <a:r>
+              <a:rPr lang="en-IN" dirty="0" smtClean="0"/>
+              <a:t>Working Modes:</a:t>
+            </a:r>
+          </a:p>
+          <a:p>
+            <a:pPr marL="633413" algn="just">
+              <a:buFont typeface="Wingdings" panose="05000000000000000000" pitchFamily="2" charset="2"/>
+              <a:buChar char="v"/>
+            </a:pPr>
+            <a:r>
+              <a:rPr lang="en-IN" dirty="0" smtClean="0"/>
+              <a:t>Interrupt based Operational Design to conserve Battery</a:t>
+            </a:r>
+          </a:p>
+          <a:p>
+            <a:pPr marL="633413" algn="just">
+              <a:buFont typeface="Wingdings" panose="05000000000000000000" pitchFamily="2" charset="2"/>
+              <a:buChar char="v"/>
+            </a:pPr>
+            <a:r>
+              <a:rPr lang="en-IN" dirty="0" smtClean="0"/>
+              <a:t>Timer A2 programmed to wake up MSP432 at 1 second interval</a:t>
+            </a:r>
+          </a:p>
+          <a:p>
+            <a:pPr marL="633413" algn="just">
+              <a:buFont typeface="Wingdings" panose="05000000000000000000" pitchFamily="2" charset="2"/>
+              <a:buChar char="v"/>
+            </a:pPr>
+            <a:r>
+              <a:rPr lang="en-IN" dirty="0" smtClean="0"/>
+              <a:t>At every wake up, MSP432 collects information from all the slaves and goes to sleep again</a:t>
+            </a:r>
+            <a:endParaRPr lang="en-IN" dirty="0"/>
+          </a:p>
+        </p:txBody>
+      </p:sp>
+      <p:sp>
+        <p:nvSpPr>
+          <p:cNvPr id="3" name="Content Placeholder 2"/>
+          <p:cNvSpPr>
+            <a:spLocks noGrp="1"/>
+          </p:cNvSpPr>
+          <p:nvPr>
+            <p:ph sz="quarter" idx="10"/>
+          </p:nvPr>
+        </p:nvSpPr>
+        <p:spPr>
+          <a:xfrm>
+            <a:off x="304800" y="-2458"/>
+            <a:ext cx="6324600" cy="1143000"/>
+          </a:xfrm>
+        </p:spPr>
+        <p:txBody>
+          <a:bodyPr/>
+          <a:lstStyle/>
+          <a:p>
+            <a:r>
+              <a:rPr lang="en-IN" dirty="0" smtClean="0"/>
+              <a:t>Main Controller</a:t>
+            </a:r>
+            <a:endParaRPr lang="en-IN" dirty="0"/>
+          </a:p>
+        </p:txBody>
+      </p:sp>
+    </p:spTree>
+    <p:extLst>
+      <p:ext uri="{BB962C8B-B14F-4D97-AF65-F5344CB8AC3E}">
+        <p14:creationId xmlns:p14="http://schemas.microsoft.com/office/powerpoint/2010/main" val="4085479075"/>
+      </p:ext>
+    </p:extLst>
+  </p:cSld>
+  <p:clrMapOvr>
+    <a:masterClrMapping/>
+  </p:clrMapOvr>
+</p:sld>
+</file>
+
+<file path=ppt/slides/slide27.xml><?xml version="1.0" encoding="utf-8"?>
+<p:sld xmlns:a="http://schemas.openxmlformats.org/drawingml/2006/main" xmlns:r="http://schemas.openxmlformats.org/officeDocument/2006/relationships" xmlns:p="http://schemas.openxmlformats.org/presentationml/2006/main">
+  <p:cSld>
+    <p:spTree>
+      <p:nvGrpSpPr>
+        <p:cNvPr id="1" name=""/>
+        <p:cNvGrpSpPr/>
+        <p:nvPr/>
+      </p:nvGrpSpPr>
+      <p:grpSpPr>
+        <a:xfrm>
+          <a:off x="0" y="0"/>
+          <a:ext cx="0" cy="0"/>
+          <a:chOff x="0" y="0"/>
+          <a:chExt cx="0" cy="0"/>
+        </a:xfrm>
+      </p:grpSpPr>
+      <p:sp>
+        <p:nvSpPr>
+          <p:cNvPr id="2" name="Content Placeholder 1"/>
+          <p:cNvSpPr>
+            <a:spLocks noGrp="1"/>
+          </p:cNvSpPr>
+          <p:nvPr>
+            <p:ph idx="1"/>
+          </p:nvPr>
+        </p:nvSpPr>
+        <p:spPr>
+          <a:xfrm>
+            <a:off x="304800" y="1140542"/>
+            <a:ext cx="8458200" cy="5031657"/>
+          </a:xfrm>
+        </p:spPr>
+        <p:txBody>
+          <a:bodyPr>
+            <a:normAutofit/>
+          </a:bodyPr>
+          <a:lstStyle/>
+          <a:p>
+            <a:pPr>
+              <a:buFont typeface="Arial" panose="020B0604020202020204" pitchFamily="34" charset="0"/>
+              <a:buChar char="•"/>
+            </a:pPr>
+            <a:r>
+              <a:rPr lang="en-IN" dirty="0" smtClean="0"/>
+              <a:t>Model : Arduino Due</a:t>
+            </a:r>
+          </a:p>
+          <a:p>
+            <a:pPr>
+              <a:buFont typeface="Arial" panose="020B0604020202020204" pitchFamily="34" charset="0"/>
+              <a:buChar char="•"/>
+            </a:pPr>
+            <a:r>
+              <a:rPr lang="en-IN" dirty="0" smtClean="0"/>
+              <a:t>Programming Platform : Arduino IDE</a:t>
+            </a:r>
+          </a:p>
+          <a:p>
+            <a:pPr>
+              <a:buFont typeface="Arial" panose="020B0604020202020204" pitchFamily="34" charset="0"/>
+              <a:buChar char="•"/>
+            </a:pPr>
+            <a:r>
+              <a:rPr lang="en-IN" dirty="0" smtClean="0"/>
+              <a:t>GPS Module : Generic GPS Module with NMEA format output in UART</a:t>
+            </a:r>
+          </a:p>
+          <a:p>
+            <a:pPr>
+              <a:buFont typeface="Arial" panose="020B0604020202020204" pitchFamily="34" charset="0"/>
+              <a:buChar char="•"/>
+            </a:pPr>
+            <a:r>
+              <a:rPr lang="en-IN" dirty="0" smtClean="0"/>
+              <a:t>NMEA Parsing Library : </a:t>
+            </a:r>
+            <a:r>
+              <a:rPr lang="en-IN" dirty="0" err="1" smtClean="0"/>
+              <a:t>TinyGPS</a:t>
+            </a:r>
+            <a:endParaRPr lang="en-IN" dirty="0" smtClean="0"/>
+          </a:p>
+          <a:p>
+            <a:pPr>
+              <a:buFont typeface="Arial" panose="020B0604020202020204" pitchFamily="34" charset="0"/>
+              <a:buChar char="•"/>
+            </a:pPr>
+            <a:r>
+              <a:rPr lang="en-IN" dirty="0" smtClean="0"/>
+              <a:t>I2C Slave Address : 0x21</a:t>
+            </a:r>
+          </a:p>
+          <a:p>
+            <a:pPr>
+              <a:buFont typeface="Arial" panose="020B0604020202020204" pitchFamily="34" charset="0"/>
+              <a:buChar char="•"/>
+            </a:pPr>
+            <a:r>
+              <a:rPr lang="en-IN" dirty="0" smtClean="0"/>
+              <a:t>Library created in the name : </a:t>
+            </a:r>
+            <a:r>
+              <a:rPr lang="en-IN" dirty="0" err="1" smtClean="0"/>
+              <a:t>AutoDroneGPS</a:t>
+            </a:r>
+            <a:endParaRPr lang="en-IN" dirty="0" smtClean="0"/>
+          </a:p>
+        </p:txBody>
+      </p:sp>
+      <p:sp>
+        <p:nvSpPr>
+          <p:cNvPr id="3" name="Content Placeholder 2"/>
+          <p:cNvSpPr>
+            <a:spLocks noGrp="1"/>
+          </p:cNvSpPr>
+          <p:nvPr>
+            <p:ph sz="quarter" idx="10"/>
+          </p:nvPr>
+        </p:nvSpPr>
+        <p:spPr>
+          <a:xfrm>
+            <a:off x="304800" y="-2458"/>
+            <a:ext cx="6324600" cy="1143000"/>
+          </a:xfrm>
+        </p:spPr>
+        <p:txBody>
+          <a:bodyPr/>
+          <a:lstStyle/>
+          <a:p>
+            <a:r>
+              <a:rPr lang="en-IN" dirty="0" smtClean="0"/>
+              <a:t>GPS Subsystem</a:t>
+            </a:r>
+            <a:endParaRPr lang="en-IN" dirty="0"/>
+          </a:p>
+        </p:txBody>
+      </p:sp>
+    </p:spTree>
+    <p:extLst>
+      <p:ext uri="{BB962C8B-B14F-4D97-AF65-F5344CB8AC3E}">
+        <p14:creationId xmlns:p14="http://schemas.microsoft.com/office/powerpoint/2010/main" val="491843971"/>
+      </p:ext>
+    </p:extLst>
+  </p:cSld>
+  <p:clrMapOvr>
+    <a:masterClrMapping/>
+  </p:clrMapOvr>
+</p:sld>
+</file>
+
+<file path=ppt/slides/slide28.xml><?xml version="1.0" encoding="utf-8"?>
+<p:sld xmlns:a="http://schemas.openxmlformats.org/drawingml/2006/main" xmlns:r="http://schemas.openxmlformats.org/officeDocument/2006/relationships" xmlns:p="http://schemas.openxmlformats.org/presentationml/2006/main">
+  <p:cSld>
+    <p:spTree>
+      <p:nvGrpSpPr>
+        <p:cNvPr id="1" name=""/>
+        <p:cNvGrpSpPr/>
+        <p:nvPr/>
+      </p:nvGrpSpPr>
+      <p:grpSpPr>
+        <a:xfrm>
+          <a:off x="0" y="0"/>
+          <a:ext cx="0" cy="0"/>
+          <a:chOff x="0" y="0"/>
+          <a:chExt cx="0" cy="0"/>
+        </a:xfrm>
+      </p:grpSpPr>
+      <p:sp>
+        <p:nvSpPr>
+          <p:cNvPr id="2" name="Content Placeholder 1"/>
+          <p:cNvSpPr>
+            <a:spLocks noGrp="1"/>
+          </p:cNvSpPr>
+          <p:nvPr>
+            <p:ph idx="1"/>
+          </p:nvPr>
+        </p:nvSpPr>
+        <p:spPr>
+          <a:xfrm>
+            <a:off x="304800" y="1140542"/>
+            <a:ext cx="8458200" cy="5031657"/>
+          </a:xfrm>
+        </p:spPr>
+        <p:txBody>
+          <a:bodyPr>
+            <a:normAutofit/>
+          </a:bodyPr>
+          <a:lstStyle/>
+          <a:p>
+            <a:pPr>
+              <a:buFont typeface="Arial" panose="020B0604020202020204" pitchFamily="34" charset="0"/>
+              <a:buChar char="•"/>
+            </a:pPr>
+            <a:r>
+              <a:rPr lang="en-IN" dirty="0" smtClean="0"/>
+              <a:t>Model : Arduino Due</a:t>
+            </a:r>
+          </a:p>
+          <a:p>
+            <a:pPr>
+              <a:buFont typeface="Arial" panose="020B0604020202020204" pitchFamily="34" charset="0"/>
+              <a:buChar char="•"/>
+            </a:pPr>
+            <a:r>
+              <a:rPr lang="en-IN" dirty="0" smtClean="0"/>
+              <a:t>Programming Platform : Arduino IDE</a:t>
+            </a:r>
+          </a:p>
+          <a:p>
+            <a:pPr>
+              <a:buFont typeface="Arial" panose="020B0604020202020204" pitchFamily="34" charset="0"/>
+              <a:buChar char="•"/>
+            </a:pPr>
+            <a:r>
+              <a:rPr lang="en-IN" dirty="0" smtClean="0"/>
+              <a:t>IMU Sensor : BNO055</a:t>
+            </a:r>
+          </a:p>
+          <a:p>
+            <a:pPr>
+              <a:buFont typeface="Arial" panose="020B0604020202020204" pitchFamily="34" charset="0"/>
+              <a:buChar char="•"/>
+            </a:pPr>
+            <a:r>
+              <a:rPr lang="en-IN" dirty="0" smtClean="0"/>
+              <a:t>Sensor Support Library : </a:t>
+            </a:r>
+            <a:r>
+              <a:rPr lang="en-IN" dirty="0" err="1" smtClean="0"/>
+              <a:t>Adafruit</a:t>
+            </a:r>
+            <a:r>
+              <a:rPr lang="en-IN" dirty="0" smtClean="0"/>
+              <a:t> BNO055 Library</a:t>
+            </a:r>
+          </a:p>
+          <a:p>
+            <a:pPr>
+              <a:buFont typeface="Arial" panose="020B0604020202020204" pitchFamily="34" charset="0"/>
+              <a:buChar char="•"/>
+            </a:pPr>
+            <a:r>
+              <a:rPr lang="en-IN" dirty="0" smtClean="0"/>
+              <a:t>I2C Slave Address : 0x11</a:t>
+            </a:r>
+          </a:p>
+          <a:p>
+            <a:pPr>
+              <a:buFont typeface="Arial" panose="020B0604020202020204" pitchFamily="34" charset="0"/>
+              <a:buChar char="•"/>
+            </a:pPr>
+            <a:r>
+              <a:rPr lang="en-IN" dirty="0" smtClean="0"/>
+              <a:t>Library created in the name : </a:t>
+            </a:r>
+            <a:r>
+              <a:rPr lang="en-IN" dirty="0" err="1" smtClean="0"/>
+              <a:t>AutoDroneIMU</a:t>
+            </a:r>
+            <a:endParaRPr lang="en-IN" dirty="0" smtClean="0"/>
+          </a:p>
+        </p:txBody>
+      </p:sp>
+      <p:sp>
+        <p:nvSpPr>
+          <p:cNvPr id="3" name="Content Placeholder 2"/>
+          <p:cNvSpPr>
+            <a:spLocks noGrp="1"/>
+          </p:cNvSpPr>
+          <p:nvPr>
+            <p:ph sz="quarter" idx="10"/>
+          </p:nvPr>
+        </p:nvSpPr>
+        <p:spPr>
+          <a:xfrm>
+            <a:off x="304800" y="-2458"/>
+            <a:ext cx="6324600" cy="1143000"/>
+          </a:xfrm>
+        </p:spPr>
+        <p:txBody>
+          <a:bodyPr/>
+          <a:lstStyle/>
+          <a:p>
+            <a:r>
+              <a:rPr lang="en-IN" dirty="0" smtClean="0"/>
+              <a:t>IMU</a:t>
+            </a:r>
+            <a:r>
+              <a:rPr lang="en-IN" dirty="0" smtClean="0"/>
+              <a:t> Subsystem</a:t>
+            </a:r>
+            <a:endParaRPr lang="en-IN" dirty="0"/>
+          </a:p>
+        </p:txBody>
+      </p:sp>
+    </p:spTree>
+    <p:extLst>
+      <p:ext uri="{BB962C8B-B14F-4D97-AF65-F5344CB8AC3E}">
+        <p14:creationId xmlns:p14="http://schemas.microsoft.com/office/powerpoint/2010/main" val="2340840467"/>
+      </p:ext>
+    </p:extLst>
+  </p:cSld>
+  <p:clrMapOvr>
+    <a:masterClrMapping/>
+  </p:clrMapOvr>
+</p:sld>
+</file>
+
+<file path=ppt/slides/slide29.xml><?xml version="1.0" encoding="utf-8"?>
 <p:sld xmlns:a="http://schemas.openxmlformats.org/drawingml/2006/main" xmlns:r="http://schemas.openxmlformats.org/officeDocument/2006/relationships" xmlns:p="http://schemas.openxmlformats.org/presentationml/2006/main">
   <p:cSld>
     <p:spTree>
@@ -15153,7 +16102,7 @@
         <p:spPr>
           <a:xfrm>
             <a:off x="304800" y="1295400"/>
-            <a:ext cx="8229600" cy="4525963"/>
+            <a:ext cx="8229600" cy="4953000"/>
           </a:xfrm>
         </p:spPr>
         <p:txBody>
@@ -15260,6 +16209,16 @@
             <a:r>
               <a:rPr lang="en-US" dirty="0" smtClean="0"/>
               <a:t>Conclusion</a:t>
+            </a:r>
+          </a:p>
+          <a:p>
+            <a:pPr>
+              <a:buFont typeface="Arial" panose="020B0604020202020204" pitchFamily="34" charset="0"/>
+              <a:buChar char="•"/>
+            </a:pPr>
+            <a:r>
+              <a:rPr lang="en-US" dirty="0" smtClean="0"/>
+              <a:t>Extensive Information</a:t>
             </a:r>
             <a:endParaRPr lang="en-US" dirty="0"/>
           </a:p>
@@ -15518,7 +16477,7 @@
         </p:spPr>
         <p:txBody>
           <a:bodyPr>
-            <a:normAutofit fontScale="92500" lnSpcReduction="10000"/>
+            <a:normAutofit lnSpcReduction="10000"/>
           </a:bodyPr>
           <a:lstStyle/>
           <a:p>
@@ -15532,11 +16491,7 @@
             <a:pPr algn="just"/>
             <a:r>
               <a:rPr lang="en-IN" dirty="0" smtClean="0"/>
-              <a:t>	To design a drone that can travel on its own from one place to </a:t>
-            </a:r>
-            <a:r>
-              <a:rPr lang="en-IN" dirty="0" smtClean="0"/>
-              <a:t>another</a:t>
+              <a:t>	To design a drone that can travel on its own from one place to another</a:t>
             </a:r>
             <a:r>
               <a:rPr lang="en-IN" dirty="0"/>
@@ -15573,7 +16528,19 @@
             </a:pPr>
             <a:r>
               <a:rPr lang="en-IN" dirty="0" smtClean="0"/>
-              <a:t>To implement a Communication Sub-system corresponding to the above architecture</a:t>
+              <a:t>To </a:t>
+            </a:r>
+            <a:r>
+              <a:rPr lang="en-IN" dirty="0" smtClean="0"/>
+              <a:t>implement </a:t>
+            </a:r>
+            <a:r>
+              <a:rPr lang="en-IN" dirty="0" smtClean="0"/>
+              <a:t>an </a:t>
+            </a:r>
+            <a:r>
+              <a:rPr lang="en-IN" dirty="0" smtClean="0"/>
+              <a:t>Autonomous driving sub-system corresponding to above architecture</a:t>
             </a:r>
             <a:endParaRPr lang="en-US" dirty="0" smtClean="0"/>
           </a:p>
@@ -15584,9 +16551,8 @@
             </a:pPr>
             <a:r>
               <a:rPr lang="en-IN" dirty="0" smtClean="0"/>
-              <a:t>To implement a Autonomous driving sub-system corresponding to above architecture</a:t>
-            </a:r>
-            <a:endParaRPr lang="en-US" dirty="0" smtClean="0"/>
+              <a:t>To implement Main Controller program corresponding to above architecture</a:t>
+            </a:r>
           </a:p>
           <a:p>
             <a:pPr algn="just">
@@ -15595,23 +16561,8 @@
             </a:pPr>
             <a:r>
               <a:rPr lang="en-IN" dirty="0" smtClean="0"/>
-              <a:t>To implement Main Controller program corresponding to above </a:t>
-            </a:r>
-            <a:r>
-              <a:rPr lang="en-IN" dirty="0" smtClean="0"/>
-              <a:t>architecture</a:t>
-            </a:r>
-          </a:p>
-          <a:p>
-            <a:pPr algn="just">
-              <a:buFont typeface="Arial" pitchFamily="34" charset="0"/>
-              <a:buChar char="•"/>
-            </a:pPr>
-            <a:r>
-              <a:rPr lang="en-IN" dirty="0" smtClean="0"/>
               <a:t>To interface the Subsystems with Main Controller using Interface Protocol</a:t>
             </a:r>
-            <a:endParaRPr lang="en-IN" dirty="0" smtClean="0"/>
           </a:p>
           <a:p>
             <a:pPr algn="just">
@@ -16003,8 +16954,13 @@
             </a:pPr>
             <a:r>
               <a:rPr lang="en-IN" dirty="0" smtClean="0"/>
-              <a:t>An autonomous driving sub-system,</a:t>
-            </a:r>
+              <a:t>An autonomous driving </a:t>
+            </a:r>
+            <a:r>
+              <a:rPr lang="en-IN" dirty="0" smtClean="0"/>
+              <a:t>sub-system</a:t>
+            </a:r>
+            <a:endParaRPr lang="en-IN" dirty="0" smtClean="0"/>
           </a:p>
           <a:p>
             <a:pPr>
@@ -16013,8 +16969,17 @@
             </a:pPr>
             <a:r>
               <a:rPr lang="en-IN" dirty="0" smtClean="0"/>
-              <a:t> A communication sub-system </a:t>
-            </a:r>
+              <a:t>A </a:t>
+            </a:r>
+            <a:r>
+              <a:rPr lang="en-IN" dirty="0" smtClean="0"/>
+              <a:t>communication </a:t>
+            </a:r>
+            <a:r>
+              <a:rPr lang="en-IN" dirty="0" smtClean="0"/>
+              <a:t>sub-system</a:t>
+            </a:r>
+            <a:endParaRPr lang="en-IN" dirty="0" smtClean="0"/>
           </a:p>
           <a:p>
             <a:pPr>
@@ -16023,7 +16988,11 @@
             </a:pPr>
             <a:r>
               <a:rPr lang="en-IN" dirty="0" smtClean="0"/>
-              <a:t> An obstacle avoidance sub-system. </a:t>
+              <a:t>An </a:t>
+            </a:r>
+            <a:r>
+              <a:rPr lang="en-IN" dirty="0" smtClean="0"/>
+              <a:t>obstacle avoidance sub-system. </a:t>
             </a:r>
           </a:p>
           <a:p>
@@ -16121,19 +17090,7 @@
             </a:pPr>
             <a:r>
               <a:rPr lang="en-IN" sz="2800" dirty="0" smtClean="0"/>
-              <a:t>Communication </a:t>
-            </a:r>
-            <a:r>
-              <a:rPr lang="en-IN" sz="2800" dirty="0" smtClean="0"/>
-              <a:t>sub-system </a:t>
-            </a:r>
-            <a:r>
-              <a:rPr lang="en-IN" sz="2800" dirty="0" smtClean="0"/>
-              <a:t>aimed </a:t>
-            </a:r>
-            <a:r>
-              <a:rPr lang="en-IN" sz="2800" dirty="0" smtClean="0"/>
-              <a:t>at providing communication between the drone and the user</a:t>
+              <a:t>Communication sub-system aimed at providing communication between the drone and the user</a:t>
             </a:r>
           </a:p>
           <a:p>
@@ -16143,11 +17100,7 @@
             </a:pPr>
             <a:r>
               <a:rPr lang="en-IN" sz="2800" dirty="0" smtClean="0"/>
-              <a:t>Autonomous </a:t>
-            </a:r>
-            <a:r>
-              <a:rPr lang="en-IN" sz="2800" dirty="0" smtClean="0"/>
-              <a:t>driving subsystem contains two input sensors, a GPS receiver and an IMU unit.</a:t>
+              <a:t>Autonomous driving subsystem contains two input sensors, a GPS receiver and an IMU unit.</a:t>
             </a:r>
           </a:p>
           <a:p>
@@ -16157,23 +17110,7 @@
             </a:pPr>
             <a:r>
               <a:rPr lang="en-IN" sz="2800" dirty="0" smtClean="0"/>
-              <a:t>Obstacle </a:t>
-            </a:r>
-            <a:r>
-              <a:rPr lang="en-IN" sz="2800" dirty="0" smtClean="0"/>
-              <a:t>avoidance </a:t>
-            </a:r>
-            <a:r>
-              <a:rPr lang="en-IN" sz="2800" dirty="0" smtClean="0"/>
-              <a:t>sub-systems </a:t>
-            </a:r>
-            <a:r>
-              <a:rPr lang="en-IN" sz="2800" dirty="0" smtClean="0"/>
-              <a:t>constantly looks for any obstacles it gets in its </a:t>
-            </a:r>
-            <a:r>
-              <a:rPr lang="en-IN" sz="2800" dirty="0" smtClean="0"/>
-              <a:t>way.</a:t>
+              <a:t>Obstacle avoidance sub-systems constantly looks for any obstacles it gets in its way.</a:t>
             </a:r>
           </a:p>
           <a:p>

</xml_diff>